<commit_message>
updated Shawn's bio and added some content to the lunch and learn presentation
</commit_message>
<xml_diff>
--- a/Presentations/BDD Lunch & Learn.pptx
+++ b/Presentations/BDD Lunch & Learn.pptx
@@ -196,7 +196,7 @@
           <a:p>
             <a:fld id="{1D091EE3-F36B-4F16-85E3-8659902D7611}" type="datetimeFigureOut">
               <a:rPr lang="en-US" smtClean="0"/>
-              <a:t>2/25/2011</a:t>
+              <a:t>2/28/11</a:t>
             </a:fld>
             <a:endParaRPr lang="en-US"/>
           </a:p>
@@ -364,6 +364,11 @@
         </p:txBody>
       </p:sp>
     </p:spTree>
+    <p:extLst>
+      <p:ext uri="{BB962C8B-B14F-4D97-AF65-F5344CB8AC3E}">
+        <p14:creationId xmlns:p14="http://schemas.microsoft.com/office/powerpoint/2010/main" val="3371909597"/>
+      </p:ext>
+    </p:extLst>
   </p:cSld>
   <p:clrMap bg1="lt1" tx1="dk1" bg2="lt2" tx2="dk2" accent1="accent1" accent2="accent2" accent3="accent3" accent4="accent4" accent5="accent5" accent6="accent6" hlink="hlink" folHlink="folHlink"/>
   <p:notesStyle>
@@ -508,7 +513,7 @@
         <p:nvSpPr>
           <p:cNvPr id="8194" name="Rectangle 2"/>
           <p:cNvSpPr>
-            <a:spLocks noRot="1" noChangeArrowheads="1" noTextEdit="1"/>
+            <a:spLocks noGrp="1" noRot="1" noChangeAspect="1" noChangeArrowheads="1" noTextEdit="1"/>
           </p:cNvSpPr>
           <p:nvPr>
             <p:ph type="sldImg"/>
@@ -726,7 +731,7 @@
           <a:p>
             <a:fld id="{1653B05B-DD7C-4C23-878E-99C6F175D4D9}" type="datetimeFigureOut">
               <a:rPr lang="en-US" smtClean="0"/>
-              <a:t>2/25/2011</a:t>
+              <a:t>2/28/11</a:t>
             </a:fld>
             <a:endParaRPr lang="en-US"/>
           </a:p>
@@ -891,7 +896,7 @@
           <a:p>
             <a:fld id="{1653B05B-DD7C-4C23-878E-99C6F175D4D9}" type="datetimeFigureOut">
               <a:rPr lang="en-US" smtClean="0"/>
-              <a:t>2/25/2011</a:t>
+              <a:t>2/28/11</a:t>
             </a:fld>
             <a:endParaRPr lang="en-US"/>
           </a:p>
@@ -1066,7 +1071,7 @@
           <a:p>
             <a:fld id="{1653B05B-DD7C-4C23-878E-99C6F175D4D9}" type="datetimeFigureOut">
               <a:rPr lang="en-US" smtClean="0"/>
-              <a:t>2/25/2011</a:t>
+              <a:t>2/28/11</a:t>
             </a:fld>
             <a:endParaRPr lang="en-US"/>
           </a:p>
@@ -1231,7 +1236,7 @@
           <a:p>
             <a:fld id="{1653B05B-DD7C-4C23-878E-99C6F175D4D9}" type="datetimeFigureOut">
               <a:rPr lang="en-US" smtClean="0"/>
-              <a:t>2/25/2011</a:t>
+              <a:t>2/28/11</a:t>
             </a:fld>
             <a:endParaRPr lang="en-US"/>
           </a:p>
@@ -1472,7 +1477,7 @@
           <a:p>
             <a:fld id="{1653B05B-DD7C-4C23-878E-99C6F175D4D9}" type="datetimeFigureOut">
               <a:rPr lang="en-US" smtClean="0"/>
-              <a:t>2/25/2011</a:t>
+              <a:t>2/28/11</a:t>
             </a:fld>
             <a:endParaRPr lang="en-US"/>
           </a:p>
@@ -1755,7 +1760,7 @@
           <a:p>
             <a:fld id="{1653B05B-DD7C-4C23-878E-99C6F175D4D9}" type="datetimeFigureOut">
               <a:rPr lang="en-US" smtClean="0"/>
-              <a:t>2/25/2011</a:t>
+              <a:t>2/28/11</a:t>
             </a:fld>
             <a:endParaRPr lang="en-US"/>
           </a:p>
@@ -2172,7 +2177,7 @@
           <a:p>
             <a:fld id="{1653B05B-DD7C-4C23-878E-99C6F175D4D9}" type="datetimeFigureOut">
               <a:rPr lang="en-US" smtClean="0"/>
-              <a:t>2/25/2011</a:t>
+              <a:t>2/28/11</a:t>
             </a:fld>
             <a:endParaRPr lang="en-US"/>
           </a:p>
@@ -2285,7 +2290,7 @@
           <a:p>
             <a:fld id="{1653B05B-DD7C-4C23-878E-99C6F175D4D9}" type="datetimeFigureOut">
               <a:rPr lang="en-US" smtClean="0"/>
-              <a:t>2/25/2011</a:t>
+              <a:t>2/28/11</a:t>
             </a:fld>
             <a:endParaRPr lang="en-US"/>
           </a:p>
@@ -2375,7 +2380,7 @@
           <a:p>
             <a:fld id="{1653B05B-DD7C-4C23-878E-99C6F175D4D9}" type="datetimeFigureOut">
               <a:rPr lang="en-US" smtClean="0"/>
-              <a:t>2/25/2011</a:t>
+              <a:t>2/28/11</a:t>
             </a:fld>
             <a:endParaRPr lang="en-US"/>
           </a:p>
@@ -2647,7 +2652,7 @@
           <a:p>
             <a:fld id="{1653B05B-DD7C-4C23-878E-99C6F175D4D9}" type="datetimeFigureOut">
               <a:rPr lang="en-US" smtClean="0"/>
-              <a:t>2/25/2011</a:t>
+              <a:t>2/28/11</a:t>
             </a:fld>
             <a:endParaRPr lang="en-US"/>
           </a:p>
@@ -2895,7 +2900,7 @@
           <a:p>
             <a:fld id="{1653B05B-DD7C-4C23-878E-99C6F175D4D9}" type="datetimeFigureOut">
               <a:rPr lang="en-US" smtClean="0"/>
-              <a:t>2/25/2011</a:t>
+              <a:t>2/28/11</a:t>
             </a:fld>
             <a:endParaRPr lang="en-US"/>
           </a:p>
@@ -3103,7 +3108,7 @@
           <a:p>
             <a:fld id="{1653B05B-DD7C-4C23-878E-99C6F175D4D9}" type="datetimeFigureOut">
               <a:rPr lang="en-US" smtClean="0"/>
-              <a:t>2/25/2011</a:t>
+              <a:t>2/28/11</a:t>
             </a:fld>
             <a:endParaRPr lang="en-US"/>
           </a:p>
@@ -3715,7 +3720,7 @@
         <p:nvGraphicFramePr>
           <p:cNvPr id="3084" name="Object 12"/>
           <p:cNvGraphicFramePr>
-            <a:graphicFrameLocks noChangeAspect="1"/>
+            <a:graphicFrameLocks noGrp="1" noChangeAspect="1"/>
           </p:cNvGraphicFramePr>
           <p:nvPr>
             <p:ph idx="1"/>
@@ -3727,9 +3732,84 @@
         </p:xfrm>
         <a:graphic>
           <a:graphicData uri="http://schemas.openxmlformats.org/presentationml/2006/ole">
-            <p:oleObj spid="_x0000_s1026" name="VISIO" r:id="rId4" imgW="2544803" imgH="251238" progId="Visio.Drawing.5">
-              <p:embed/>
-            </p:oleObj>
+            <mc:AlternateContent xmlns:mc="http://schemas.openxmlformats.org/markup-compatibility/2006">
+              <mc:Choice xmlns:v="urn:schemas-microsoft-com:vml" Requires="v">
+                <p:oleObj spid="_x0000_s1029" name="VISIO" r:id="rId4" imgW="2544803" imgH="251238" progId="Visio.Drawing.5">
+                  <p:embed/>
+                </p:oleObj>
+              </mc:Choice>
+              <mc:Fallback>
+                <p:oleObj name="VISIO" r:id="rId4" imgW="2544803" imgH="251238" progId="Visio.Drawing.5">
+                  <p:embed/>
+                  <p:pic>
+                    <p:nvPicPr>
+                      <p:cNvPr id="0" name="Picture 2"/>
+                      <p:cNvPicPr>
+                        <a:picLocks noChangeAspect="1" noChangeArrowheads="1"/>
+                      </p:cNvPicPr>
+                      <p:nvPr/>
+                    </p:nvPicPr>
+                    <p:blipFill>
+                      <a:blip r:embed="rId5">
+                        <a:extLst>
+                          <a:ext uri="{28A0092B-C50C-407E-A947-70E740481C1C}">
+                            <a14:useLocalDpi xmlns:a14="http://schemas.microsoft.com/office/drawing/2010/main" val="0"/>
+                          </a:ext>
+                        </a:extLst>
+                      </a:blip>
+                      <a:srcRect/>
+                      <a:stretch>
+                        <a:fillRect/>
+                      </a:stretch>
+                    </p:blipFill>
+                    <p:spPr bwMode="auto">
+                      <a:xfrm>
+                        <a:off x="2209800" y="1295400"/>
+                        <a:ext cx="4724400" cy="465138"/>
+                      </a:xfrm>
+                      <a:prstGeom prst="rect">
+                        <a:avLst/>
+                      </a:prstGeom>
+                      <a:noFill/>
+                      <a:ln>
+                        <a:noFill/>
+                      </a:ln>
+                      <a:effectLst/>
+                      <a:extLst>
+                        <a:ext uri="{909E8E84-426E-40dd-AFC4-6F175D3DCCD1}">
+                          <a14:hiddenFill xmlns:a14="http://schemas.microsoft.com/office/drawing/2010/main">
+                            <a:solidFill>
+                              <a:schemeClr val="accent1"/>
+                            </a:solidFill>
+                          </a14:hiddenFill>
+                        </a:ext>
+                        <a:ext uri="{91240B29-F687-4f45-9708-019B960494DF}">
+                          <a14:hiddenLine xmlns:a14="http://schemas.microsoft.com/office/drawing/2010/main" w="9525">
+                            <a:solidFill>
+                              <a:schemeClr val="tx1"/>
+                            </a:solidFill>
+                            <a:miter lim="800000"/>
+                            <a:headEnd/>
+                            <a:tailEnd/>
+                          </a14:hiddenLine>
+                        </a:ext>
+                        <a:ext uri="{AF507438-7753-43e0-B8FC-AC1667EBCBE1}">
+                          <a14:hiddenEffects xmlns:a14="http://schemas.microsoft.com/office/drawing/2010/main">
+                            <a:effectLst>
+                              <a:outerShdw blurRad="63500" dist="38099" dir="2700000" algn="ctr" rotWithShape="0">
+                                <a:schemeClr val="bg2">
+                                  <a:alpha val="74998"/>
+                                </a:schemeClr>
+                              </a:outerShdw>
+                            </a:effectLst>
+                          </a14:hiddenEffects>
+                        </a:ext>
+                      </a:extLst>
+                    </p:spPr>
+                  </p:pic>
+                </p:oleObj>
+              </mc:Fallback>
+            </mc:AlternateContent>
           </a:graphicData>
         </a:graphic>
       </p:graphicFrame>
@@ -3911,16 +3991,51 @@
             <p:ph sz="half" idx="1"/>
           </p:nvPr>
         </p:nvSpPr>
-        <p:spPr/>
-        <p:txBody>
-          <a:bodyPr/>
-          <a:lstStyle/>
-          <a:p>
+        <p:spPr>
+          <a:xfrm>
+            <a:off x="457200" y="381000"/>
+            <a:ext cx="4038600" cy="5745163"/>
+          </a:xfrm>
+        </p:spPr>
+        <p:txBody>
+          <a:bodyPr/>
+          <a:lstStyle/>
+          <a:p>
+            <a:pPr marL="0" indent="0" algn="ctr">
+              <a:buNone/>
+            </a:pPr>
             <a:r>
               <a:rPr lang="en-US" dirty="0" smtClean="0"/>
-              <a:t>Shawn</a:t>
-            </a:r>
-            <a:endParaRPr lang="en-US" dirty="0"/>
+              <a:t>Shawn Wallace</a:t>
+            </a:r>
+          </a:p>
+          <a:p>
+            <a:pPr marL="0" indent="0">
+              <a:buNone/>
+            </a:pPr>
+            <a:endParaRPr lang="en-US" sz="1600" dirty="0" smtClean="0"/>
+          </a:p>
+          <a:p>
+            <a:pPr marL="0" indent="0">
+              <a:buNone/>
+            </a:pPr>
+            <a:r>
+              <a:rPr lang="en-US" sz="1600" dirty="0" smtClean="0">
+                <a:hlinkClick r:id="rId2"/>
+              </a:rPr>
+              <a:t>c-wallas@grangeinsurance.com</a:t>
+            </a:r>
+            <a:endParaRPr lang="en-US" sz="1600" dirty="0" smtClean="0"/>
+          </a:p>
+          <a:p>
+            <a:pPr marL="0" indent="0">
+              <a:buNone/>
+            </a:pPr>
+            <a:r>
+              <a:rPr lang="en-US" sz="1600" dirty="0" smtClean="0"/>
+              <a:t>614.270-1600</a:t>
+            </a:r>
+            <a:endParaRPr lang="en-US" sz="1600" dirty="0"/>
           </a:p>
         </p:txBody>
       </p:sp>
@@ -3934,16 +4049,21 @@
             <p:ph sz="half" idx="2"/>
           </p:nvPr>
         </p:nvSpPr>
-        <p:spPr/>
-        <p:txBody>
-          <a:bodyPr/>
-          <a:lstStyle/>
-          <a:p>
-            <a:pPr>
+        <p:spPr>
+          <a:xfrm>
+            <a:off x="4648200" y="381000"/>
+            <a:ext cx="4038600" cy="5745163"/>
+          </a:xfrm>
+        </p:spPr>
+        <p:txBody>
+          <a:bodyPr/>
+          <a:lstStyle/>
+          <a:p>
+            <a:pPr algn="ctr">
               <a:buNone/>
             </a:pPr>
             <a:r>
-              <a:rPr lang="en-US" smtClean="0"/>
+              <a:rPr lang="en-US" dirty="0" smtClean="0"/>
               <a:t>Andy Vida</a:t>
             </a:r>
           </a:p>

</xml_diff>

<commit_message>
added some cucumber slides to the presentation
</commit_message>
<xml_diff>
--- a/Presentations/BDD Lunch & Learn.pptx
+++ b/Presentations/BDD Lunch & Learn.pptx
@@ -5,14 +5,19 @@
     <p:sldMasterId id="2147483648" r:id="rId1"/>
   </p:sldMasterIdLst>
   <p:notesMasterIdLst>
-    <p:notesMasterId r:id="rId7"/>
+    <p:notesMasterId r:id="rId12"/>
   </p:notesMasterIdLst>
   <p:sldIdLst>
     <p:sldId id="256" r:id="rId2"/>
     <p:sldId id="257" r:id="rId3"/>
     <p:sldId id="258" r:id="rId4"/>
-    <p:sldId id="260" r:id="rId5"/>
-    <p:sldId id="261" r:id="rId6"/>
+    <p:sldId id="262" r:id="rId5"/>
+    <p:sldId id="263" r:id="rId6"/>
+    <p:sldId id="264" r:id="rId7"/>
+    <p:sldId id="265" r:id="rId8"/>
+    <p:sldId id="266" r:id="rId9"/>
+    <p:sldId id="260" r:id="rId10"/>
+    <p:sldId id="261" r:id="rId11"/>
   </p:sldIdLst>
   <p:sldSz cx="9144000" cy="6858000" type="screen4x3"/>
   <p:notesSz cx="6858000" cy="9144000"/>
@@ -196,7 +201,8 @@
           <a:p>
             <a:fld id="{1D091EE3-F36B-4F16-85E3-8659902D7611}" type="datetimeFigureOut">
               <a:rPr lang="en-US" smtClean="0"/>
-              <a:t>2/28/11</a:t>
+              <a:pPr/>
+              <a:t>3/1/2011</a:t>
             </a:fld>
             <a:endParaRPr lang="en-US"/>
           </a:p>
@@ -357,6 +363,7 @@
           <a:p>
             <a:fld id="{B11DEF3E-FE12-4F21-AE79-15D58AC530AF}" type="slidenum">
               <a:rPr lang="en-US" smtClean="0"/>
+              <a:pPr/>
               <a:t>‹#›</a:t>
             </a:fld>
             <a:endParaRPr lang="en-US"/>
@@ -366,7 +373,7 @@
     </p:spTree>
     <p:extLst>
       <p:ext uri="{BB962C8B-B14F-4D97-AF65-F5344CB8AC3E}">
-        <p14:creationId xmlns:p14="http://schemas.microsoft.com/office/powerpoint/2010/main" val="3371909597"/>
+        <p14:creationId xmlns:p14="http://schemas.microsoft.com/office/powerpoint/2010/main" xmlns="" val="3371909597"/>
       </p:ext>
     </p:extLst>
   </p:cSld>
@@ -485,6 +492,313 @@
       </p:grpSpPr>
       <p:sp>
         <p:nvSpPr>
+          <p:cNvPr id="2" name="Slide Image Placeholder 1"/>
+          <p:cNvSpPr>
+            <a:spLocks noGrp="1" noRot="1" noChangeAspect="1"/>
+          </p:cNvSpPr>
+          <p:nvPr>
+            <p:ph type="sldImg"/>
+          </p:nvPr>
+        </p:nvSpPr>
+        <p:spPr/>
+      </p:sp>
+      <p:sp>
+        <p:nvSpPr>
+          <p:cNvPr id="3" name="Notes Placeholder 2"/>
+          <p:cNvSpPr>
+            <a:spLocks noGrp="1"/>
+          </p:cNvSpPr>
+          <p:nvPr>
+            <p:ph type="body" idx="1"/>
+          </p:nvPr>
+        </p:nvSpPr>
+        <p:spPr/>
+        <p:txBody>
+          <a:bodyPr>
+            <a:normAutofit/>
+          </a:bodyPr>
+          <a:lstStyle/>
+          <a:p>
+            <a:pPr marL="0" marR="0" lvl="0" indent="0" algn="l" defTabSz="914400" rtl="0" eaLnBrk="1" fontAlgn="auto" latinLnBrk="0" hangingPunct="1">
+              <a:lnSpc>
+                <a:spcPct val="100000"/>
+              </a:lnSpc>
+              <a:spcBef>
+                <a:spcPts val="0"/>
+              </a:spcBef>
+              <a:spcAft>
+                <a:spcPts val="0"/>
+              </a:spcAft>
+              <a:buClrTx/>
+              <a:buSzTx/>
+              <a:buFontTx/>
+              <a:buNone/>
+              <a:tabLst/>
+              <a:defRPr/>
+            </a:pPr>
+            <a:r>
+              <a:rPr lang="en-US" sz="1200" kern="1200" dirty="0" smtClean="0">
+                <a:solidFill>
+                  <a:schemeClr val="tx1"/>
+                </a:solidFill>
+                <a:latin typeface="+mn-lt"/>
+                <a:ea typeface="+mn-ea"/>
+                <a:cs typeface="+mn-cs"/>
+              </a:rPr>
+              <a:t>Within the definition of a feature you can provide a plain text description of the story, focusing on three important questions:</a:t>
+            </a:r>
+          </a:p>
+          <a:p>
+            <a:endParaRPr lang="en-US" dirty="0"/>
+          </a:p>
+        </p:txBody>
+      </p:sp>
+      <p:sp>
+        <p:nvSpPr>
+          <p:cNvPr id="4" name="Slide Number Placeholder 3"/>
+          <p:cNvSpPr>
+            <a:spLocks noGrp="1"/>
+          </p:cNvSpPr>
+          <p:nvPr>
+            <p:ph type="sldNum" sz="quarter" idx="10"/>
+          </p:nvPr>
+        </p:nvSpPr>
+        <p:spPr/>
+        <p:txBody>
+          <a:bodyPr/>
+          <a:lstStyle/>
+          <a:p>
+            <a:fld id="{B11DEF3E-FE12-4F21-AE79-15D58AC530AF}" type="slidenum">
+              <a:rPr lang="en-US" smtClean="0"/>
+              <a:pPr/>
+              <a:t>6</a:t>
+            </a:fld>
+            <a:endParaRPr lang="en-US"/>
+          </a:p>
+        </p:txBody>
+      </p:sp>
+    </p:spTree>
+  </p:cSld>
+  <p:clrMapOvr>
+    <a:masterClrMapping/>
+  </p:clrMapOvr>
+</p:notes>
+</file>
+
+<file path=ppt/notesSlides/notesSlide2.xml><?xml version="1.0" encoding="utf-8"?>
+<p:notes xmlns:a="http://schemas.openxmlformats.org/drawingml/2006/main" xmlns:r="http://schemas.openxmlformats.org/officeDocument/2006/relationships" xmlns:p="http://schemas.openxmlformats.org/presentationml/2006/main">
+  <p:cSld>
+    <p:spTree>
+      <p:nvGrpSpPr>
+        <p:cNvPr id="1" name=""/>
+        <p:cNvGrpSpPr/>
+        <p:nvPr/>
+      </p:nvGrpSpPr>
+      <p:grpSpPr>
+        <a:xfrm>
+          <a:off x="0" y="0"/>
+          <a:ext cx="0" cy="0"/>
+          <a:chOff x="0" y="0"/>
+          <a:chExt cx="0" cy="0"/>
+        </a:xfrm>
+      </p:grpSpPr>
+      <p:sp>
+        <p:nvSpPr>
+          <p:cNvPr id="2" name="Slide Image Placeholder 1"/>
+          <p:cNvSpPr>
+            <a:spLocks noGrp="1" noRot="1" noChangeAspect="1"/>
+          </p:cNvSpPr>
+          <p:nvPr>
+            <p:ph type="sldImg"/>
+          </p:nvPr>
+        </p:nvSpPr>
+        <p:spPr/>
+      </p:sp>
+      <p:sp>
+        <p:nvSpPr>
+          <p:cNvPr id="3" name="Notes Placeholder 2"/>
+          <p:cNvSpPr>
+            <a:spLocks noGrp="1"/>
+          </p:cNvSpPr>
+          <p:nvPr>
+            <p:ph type="body" idx="1"/>
+          </p:nvPr>
+        </p:nvSpPr>
+        <p:spPr/>
+        <p:txBody>
+          <a:bodyPr>
+            <a:normAutofit/>
+          </a:bodyPr>
+          <a:lstStyle/>
+          <a:p>
+            <a:pPr lvl="2"/>
+            <a:r>
+              <a:rPr lang="en-US" sz="1200" i="1" kern="1200" dirty="0" smtClean="0">
+                <a:solidFill>
+                  <a:schemeClr val="tx1"/>
+                </a:solidFill>
+                <a:latin typeface="+mn-lt"/>
+                <a:ea typeface="+mn-ea"/>
+                <a:cs typeface="+mn-cs"/>
+              </a:rPr>
+              <a:t>And</a:t>
+            </a:r>
+            <a:r>
+              <a:rPr lang="en-US" sz="1200" kern="1200" dirty="0" smtClean="0">
+                <a:solidFill>
+                  <a:schemeClr val="tx1"/>
+                </a:solidFill>
+                <a:latin typeface="+mn-lt"/>
+                <a:ea typeface="+mn-ea"/>
+                <a:cs typeface="+mn-cs"/>
+              </a:rPr>
+              <a:t> can be used in any of the three sections</a:t>
+            </a:r>
+          </a:p>
+          <a:p>
+            <a:pPr lvl="2"/>
+            <a:r>
+              <a:rPr lang="en-US" sz="1200" kern="1200" dirty="0" smtClean="0">
+                <a:solidFill>
+                  <a:schemeClr val="tx1"/>
+                </a:solidFill>
+                <a:latin typeface="+mn-lt"/>
+                <a:ea typeface="+mn-ea"/>
+                <a:cs typeface="+mn-cs"/>
+              </a:rPr>
+              <a:t>It serves as nice shorthand for repeating the </a:t>
+            </a:r>
+            <a:r>
+              <a:rPr lang="en-US" sz="1200" i="1" kern="1200" dirty="0" smtClean="0">
+                <a:solidFill>
+                  <a:schemeClr val="tx1"/>
+                </a:solidFill>
+                <a:latin typeface="+mn-lt"/>
+                <a:ea typeface="+mn-ea"/>
+                <a:cs typeface="+mn-cs"/>
+              </a:rPr>
+              <a:t>Given, When, </a:t>
+            </a:r>
+            <a:r>
+              <a:rPr lang="en-US" sz="1200" kern="1200" dirty="0" smtClean="0">
+                <a:solidFill>
+                  <a:schemeClr val="tx1"/>
+                </a:solidFill>
+                <a:latin typeface="+mn-lt"/>
+                <a:ea typeface="+mn-ea"/>
+                <a:cs typeface="+mn-cs"/>
+              </a:rPr>
+              <a:t>or </a:t>
+            </a:r>
+            <a:r>
+              <a:rPr lang="en-US" sz="1200" i="1" kern="1200" dirty="0" smtClean="0">
+                <a:solidFill>
+                  <a:schemeClr val="tx1"/>
+                </a:solidFill>
+                <a:latin typeface="+mn-lt"/>
+                <a:ea typeface="+mn-ea"/>
+                <a:cs typeface="+mn-cs"/>
+              </a:rPr>
+              <a:t>Then</a:t>
+            </a:r>
+            <a:endParaRPr lang="en-US" sz="1200" kern="1200" dirty="0" smtClean="0">
+              <a:solidFill>
+                <a:schemeClr val="tx1"/>
+              </a:solidFill>
+              <a:latin typeface="+mn-lt"/>
+              <a:ea typeface="+mn-ea"/>
+              <a:cs typeface="+mn-cs"/>
+            </a:endParaRPr>
+          </a:p>
+          <a:p>
+            <a:pPr lvl="2"/>
+            <a:r>
+              <a:rPr lang="en-US" sz="1200" i="1" kern="1200" dirty="0" smtClean="0">
+                <a:solidFill>
+                  <a:schemeClr val="tx1"/>
+                </a:solidFill>
+                <a:latin typeface="+mn-lt"/>
+                <a:ea typeface="+mn-ea"/>
+                <a:cs typeface="+mn-cs"/>
+              </a:rPr>
+              <a:t>And</a:t>
+            </a:r>
+            <a:r>
+              <a:rPr lang="en-US" sz="1200" kern="1200" dirty="0" smtClean="0">
+                <a:solidFill>
+                  <a:schemeClr val="tx1"/>
+                </a:solidFill>
+                <a:latin typeface="+mn-lt"/>
+                <a:ea typeface="+mn-ea"/>
+                <a:cs typeface="+mn-cs"/>
+              </a:rPr>
+              <a:t> stands in for whatever the most recent explicitly named step was</a:t>
+            </a:r>
+          </a:p>
+          <a:p>
+            <a:pPr lvl="2"/>
+            <a:endParaRPr lang="en-US" sz="1200" kern="1200" dirty="0">
+              <a:solidFill>
+                <a:schemeClr val="tx1"/>
+              </a:solidFill>
+              <a:latin typeface="+mn-lt"/>
+              <a:ea typeface="+mn-ea"/>
+              <a:cs typeface="+mn-cs"/>
+            </a:endParaRPr>
+          </a:p>
+        </p:txBody>
+      </p:sp>
+      <p:sp>
+        <p:nvSpPr>
+          <p:cNvPr id="4" name="Slide Number Placeholder 3"/>
+          <p:cNvSpPr>
+            <a:spLocks noGrp="1"/>
+          </p:cNvSpPr>
+          <p:nvPr>
+            <p:ph type="sldNum" sz="quarter" idx="10"/>
+          </p:nvPr>
+        </p:nvSpPr>
+        <p:spPr/>
+        <p:txBody>
+          <a:bodyPr/>
+          <a:lstStyle/>
+          <a:p>
+            <a:fld id="{B11DEF3E-FE12-4F21-AE79-15D58AC530AF}" type="slidenum">
+              <a:rPr lang="en-US" smtClean="0"/>
+              <a:pPr/>
+              <a:t>8</a:t>
+            </a:fld>
+            <a:endParaRPr lang="en-US"/>
+          </a:p>
+        </p:txBody>
+      </p:sp>
+    </p:spTree>
+  </p:cSld>
+  <p:clrMapOvr>
+    <a:masterClrMapping/>
+  </p:clrMapOvr>
+</p:notes>
+</file>
+
+<file path=ppt/notesSlides/notesSlide3.xml><?xml version="1.0" encoding="utf-8"?>
+<p:notes xmlns:a="http://schemas.openxmlformats.org/drawingml/2006/main" xmlns:r="http://schemas.openxmlformats.org/officeDocument/2006/relationships" xmlns:p="http://schemas.openxmlformats.org/presentationml/2006/main">
+  <p:cSld>
+    <p:spTree>
+      <p:nvGrpSpPr>
+        <p:cNvPr id="1" name=""/>
+        <p:cNvGrpSpPr/>
+        <p:nvPr/>
+      </p:nvGrpSpPr>
+      <p:grpSpPr>
+        <a:xfrm>
+          <a:off x="0" y="0"/>
+          <a:ext cx="0" cy="0"/>
+          <a:chOff x="0" y="0"/>
+          <a:chExt cx="0" cy="0"/>
+        </a:xfrm>
+      </p:grpSpPr>
+      <p:sp>
+        <p:nvSpPr>
           <p:cNvPr id="7" name="Rectangle 7"/>
           <p:cNvSpPr>
             <a:spLocks noGrp="1" noChangeArrowheads="1"/>
@@ -503,7 +817,7 @@
             <a:fld id="{25C56F2C-BDCF-4067-9632-8519D19905E6}" type="slidenum">
               <a:rPr lang="en-US"/>
               <a:pPr/>
-              <a:t>4</a:t>
+              <a:t>9</a:t>
             </a:fld>
             <a:endParaRPr lang="en-US"/>
           </a:p>
@@ -731,7 +1045,8 @@
           <a:p>
             <a:fld id="{1653B05B-DD7C-4C23-878E-99C6F175D4D9}" type="datetimeFigureOut">
               <a:rPr lang="en-US" smtClean="0"/>
-              <a:t>2/28/11</a:t>
+              <a:pPr/>
+              <a:t>3/1/2011</a:t>
             </a:fld>
             <a:endParaRPr lang="en-US"/>
           </a:p>
@@ -773,6 +1088,7 @@
           <a:p>
             <a:fld id="{852F12C8-E606-468C-B4E5-38FEFCB6E5B2}" type="slidenum">
               <a:rPr lang="en-US" smtClean="0"/>
+              <a:pPr/>
               <a:t>‹#›</a:t>
             </a:fld>
             <a:endParaRPr lang="en-US"/>
@@ -896,7 +1212,8 @@
           <a:p>
             <a:fld id="{1653B05B-DD7C-4C23-878E-99C6F175D4D9}" type="datetimeFigureOut">
               <a:rPr lang="en-US" smtClean="0"/>
-              <a:t>2/28/11</a:t>
+              <a:pPr/>
+              <a:t>3/1/2011</a:t>
             </a:fld>
             <a:endParaRPr lang="en-US"/>
           </a:p>
@@ -938,6 +1255,7 @@
           <a:p>
             <a:fld id="{852F12C8-E606-468C-B4E5-38FEFCB6E5B2}" type="slidenum">
               <a:rPr lang="en-US" smtClean="0"/>
+              <a:pPr/>
               <a:t>‹#›</a:t>
             </a:fld>
             <a:endParaRPr lang="en-US"/>
@@ -1071,7 +1389,8 @@
           <a:p>
             <a:fld id="{1653B05B-DD7C-4C23-878E-99C6F175D4D9}" type="datetimeFigureOut">
               <a:rPr lang="en-US" smtClean="0"/>
-              <a:t>2/28/11</a:t>
+              <a:pPr/>
+              <a:t>3/1/2011</a:t>
             </a:fld>
             <a:endParaRPr lang="en-US"/>
           </a:p>
@@ -1113,6 +1432,7 @@
           <a:p>
             <a:fld id="{852F12C8-E606-468C-B4E5-38FEFCB6E5B2}" type="slidenum">
               <a:rPr lang="en-US" smtClean="0"/>
+              <a:pPr/>
               <a:t>‹#›</a:t>
             </a:fld>
             <a:endParaRPr lang="en-US"/>
@@ -1236,7 +1556,8 @@
           <a:p>
             <a:fld id="{1653B05B-DD7C-4C23-878E-99C6F175D4D9}" type="datetimeFigureOut">
               <a:rPr lang="en-US" smtClean="0"/>
-              <a:t>2/28/11</a:t>
+              <a:pPr/>
+              <a:t>3/1/2011</a:t>
             </a:fld>
             <a:endParaRPr lang="en-US"/>
           </a:p>
@@ -1278,6 +1599,7 @@
           <a:p>
             <a:fld id="{852F12C8-E606-468C-B4E5-38FEFCB6E5B2}" type="slidenum">
               <a:rPr lang="en-US" smtClean="0"/>
+              <a:pPr/>
               <a:t>‹#›</a:t>
             </a:fld>
             <a:endParaRPr lang="en-US"/>
@@ -1477,7 +1799,8 @@
           <a:p>
             <a:fld id="{1653B05B-DD7C-4C23-878E-99C6F175D4D9}" type="datetimeFigureOut">
               <a:rPr lang="en-US" smtClean="0"/>
-              <a:t>2/28/11</a:t>
+              <a:pPr/>
+              <a:t>3/1/2011</a:t>
             </a:fld>
             <a:endParaRPr lang="en-US"/>
           </a:p>
@@ -1519,6 +1842,7 @@
           <a:p>
             <a:fld id="{852F12C8-E606-468C-B4E5-38FEFCB6E5B2}" type="slidenum">
               <a:rPr lang="en-US" smtClean="0"/>
+              <a:pPr/>
               <a:t>‹#›</a:t>
             </a:fld>
             <a:endParaRPr lang="en-US"/>
@@ -1760,7 +2084,8 @@
           <a:p>
             <a:fld id="{1653B05B-DD7C-4C23-878E-99C6F175D4D9}" type="datetimeFigureOut">
               <a:rPr lang="en-US" smtClean="0"/>
-              <a:t>2/28/11</a:t>
+              <a:pPr/>
+              <a:t>3/1/2011</a:t>
             </a:fld>
             <a:endParaRPr lang="en-US"/>
           </a:p>
@@ -1802,6 +2127,7 @@
           <a:p>
             <a:fld id="{852F12C8-E606-468C-B4E5-38FEFCB6E5B2}" type="slidenum">
               <a:rPr lang="en-US" smtClean="0"/>
+              <a:pPr/>
               <a:t>‹#›</a:t>
             </a:fld>
             <a:endParaRPr lang="en-US"/>
@@ -2177,7 +2503,8 @@
           <a:p>
             <a:fld id="{1653B05B-DD7C-4C23-878E-99C6F175D4D9}" type="datetimeFigureOut">
               <a:rPr lang="en-US" smtClean="0"/>
-              <a:t>2/28/11</a:t>
+              <a:pPr/>
+              <a:t>3/1/2011</a:t>
             </a:fld>
             <a:endParaRPr lang="en-US"/>
           </a:p>
@@ -2219,6 +2546,7 @@
           <a:p>
             <a:fld id="{852F12C8-E606-468C-B4E5-38FEFCB6E5B2}" type="slidenum">
               <a:rPr lang="en-US" smtClean="0"/>
+              <a:pPr/>
               <a:t>‹#›</a:t>
             </a:fld>
             <a:endParaRPr lang="en-US"/>
@@ -2290,7 +2618,8 @@
           <a:p>
             <a:fld id="{1653B05B-DD7C-4C23-878E-99C6F175D4D9}" type="datetimeFigureOut">
               <a:rPr lang="en-US" smtClean="0"/>
-              <a:t>2/28/11</a:t>
+              <a:pPr/>
+              <a:t>3/1/2011</a:t>
             </a:fld>
             <a:endParaRPr lang="en-US"/>
           </a:p>
@@ -2332,6 +2661,7 @@
           <a:p>
             <a:fld id="{852F12C8-E606-468C-B4E5-38FEFCB6E5B2}" type="slidenum">
               <a:rPr lang="en-US" smtClean="0"/>
+              <a:pPr/>
               <a:t>‹#›</a:t>
             </a:fld>
             <a:endParaRPr lang="en-US"/>
@@ -2380,7 +2710,8 @@
           <a:p>
             <a:fld id="{1653B05B-DD7C-4C23-878E-99C6F175D4D9}" type="datetimeFigureOut">
               <a:rPr lang="en-US" smtClean="0"/>
-              <a:t>2/28/11</a:t>
+              <a:pPr/>
+              <a:t>3/1/2011</a:t>
             </a:fld>
             <a:endParaRPr lang="en-US"/>
           </a:p>
@@ -2422,6 +2753,7 @@
           <a:p>
             <a:fld id="{852F12C8-E606-468C-B4E5-38FEFCB6E5B2}" type="slidenum">
               <a:rPr lang="en-US" smtClean="0"/>
+              <a:pPr/>
               <a:t>‹#›</a:t>
             </a:fld>
             <a:endParaRPr lang="en-US"/>
@@ -2652,7 +2984,8 @@
           <a:p>
             <a:fld id="{1653B05B-DD7C-4C23-878E-99C6F175D4D9}" type="datetimeFigureOut">
               <a:rPr lang="en-US" smtClean="0"/>
-              <a:t>2/28/11</a:t>
+              <a:pPr/>
+              <a:t>3/1/2011</a:t>
             </a:fld>
             <a:endParaRPr lang="en-US"/>
           </a:p>
@@ -2694,6 +3027,7 @@
           <a:p>
             <a:fld id="{852F12C8-E606-468C-B4E5-38FEFCB6E5B2}" type="slidenum">
               <a:rPr lang="en-US" smtClean="0"/>
+              <a:pPr/>
               <a:t>‹#›</a:t>
             </a:fld>
             <a:endParaRPr lang="en-US"/>
@@ -2900,7 +3234,8 @@
           <a:p>
             <a:fld id="{1653B05B-DD7C-4C23-878E-99C6F175D4D9}" type="datetimeFigureOut">
               <a:rPr lang="en-US" smtClean="0"/>
-              <a:t>2/28/11</a:t>
+              <a:pPr/>
+              <a:t>3/1/2011</a:t>
             </a:fld>
             <a:endParaRPr lang="en-US"/>
           </a:p>
@@ -2942,6 +3277,7 @@
           <a:p>
             <a:fld id="{852F12C8-E606-468C-B4E5-38FEFCB6E5B2}" type="slidenum">
               <a:rPr lang="en-US" smtClean="0"/>
+              <a:pPr/>
               <a:t>‹#›</a:t>
             </a:fld>
             <a:endParaRPr lang="en-US"/>
@@ -3108,7 +3444,8 @@
           <a:p>
             <a:fld id="{1653B05B-DD7C-4C23-878E-99C6F175D4D9}" type="datetimeFigureOut">
               <a:rPr lang="en-US" smtClean="0"/>
-              <a:t>2/28/11</a:t>
+              <a:pPr/>
+              <a:t>3/1/2011</a:t>
             </a:fld>
             <a:endParaRPr lang="en-US"/>
           </a:p>
@@ -3186,6 +3523,7 @@
           <a:p>
             <a:fld id="{852F12C8-E606-468C-B4E5-38FEFCB6E5B2}" type="slidenum">
               <a:rPr lang="en-US" smtClean="0"/>
+              <a:pPr/>
               <a:t>‹#›</a:t>
             </a:fld>
             <a:endParaRPr lang="en-US"/>
@@ -3525,6 +3863,171 @@
   <p:clrMapOvr>
     <a:masterClrMapping/>
   </p:clrMapOvr>
+  <p:timing>
+    <p:tnLst>
+      <p:par>
+        <p:cTn id="1" dur="indefinite" restart="never" nodeType="tmRoot"/>
+      </p:par>
+    </p:tnLst>
+  </p:timing>
+</p:sld>
+</file>
+
+<file path=ppt/slides/slide10.xml><?xml version="1.0" encoding="utf-8"?>
+<p:sld xmlns:a="http://schemas.openxmlformats.org/drawingml/2006/main" xmlns:r="http://schemas.openxmlformats.org/officeDocument/2006/relationships" xmlns:p="http://schemas.openxmlformats.org/presentationml/2006/main">
+  <p:cSld>
+    <p:spTree>
+      <p:nvGrpSpPr>
+        <p:cNvPr id="1" name=""/>
+        <p:cNvGrpSpPr/>
+        <p:nvPr/>
+      </p:nvGrpSpPr>
+      <p:grpSpPr>
+        <a:xfrm>
+          <a:off x="0" y="0"/>
+          <a:ext cx="0" cy="0"/>
+          <a:chOff x="0" y="0"/>
+          <a:chExt cx="0" cy="0"/>
+        </a:xfrm>
+      </p:grpSpPr>
+      <p:sp>
+        <p:nvSpPr>
+          <p:cNvPr id="5" name="Content Placeholder 4"/>
+          <p:cNvSpPr>
+            <a:spLocks noGrp="1"/>
+          </p:cNvSpPr>
+          <p:nvPr>
+            <p:ph sz="half" idx="1"/>
+          </p:nvPr>
+        </p:nvSpPr>
+        <p:spPr>
+          <a:xfrm>
+            <a:off x="457200" y="381000"/>
+            <a:ext cx="4038600" cy="5745163"/>
+          </a:xfrm>
+        </p:spPr>
+        <p:txBody>
+          <a:bodyPr/>
+          <a:lstStyle/>
+          <a:p>
+            <a:pPr marL="0" indent="0" algn="ctr">
+              <a:buNone/>
+            </a:pPr>
+            <a:r>
+              <a:rPr lang="en-US" dirty="0" smtClean="0"/>
+              <a:t>Shawn Wallace</a:t>
+            </a:r>
+          </a:p>
+          <a:p>
+            <a:pPr marL="0" indent="0">
+              <a:buNone/>
+            </a:pPr>
+            <a:endParaRPr lang="en-US" sz="1600" dirty="0" smtClean="0"/>
+          </a:p>
+          <a:p>
+            <a:pPr marL="0" indent="0">
+              <a:buNone/>
+            </a:pPr>
+            <a:r>
+              <a:rPr lang="en-US" sz="1600" dirty="0" smtClean="0">
+                <a:hlinkClick r:id="rId2"/>
+              </a:rPr>
+              <a:t>c-wallas@grangeinsurance.com</a:t>
+            </a:r>
+            <a:endParaRPr lang="en-US" sz="1600" dirty="0" smtClean="0"/>
+          </a:p>
+          <a:p>
+            <a:pPr marL="0" indent="0">
+              <a:buNone/>
+            </a:pPr>
+            <a:r>
+              <a:rPr lang="en-US" sz="1600" dirty="0" smtClean="0"/>
+              <a:t>614.270-1600</a:t>
+            </a:r>
+            <a:endParaRPr lang="en-US" sz="1600" dirty="0"/>
+          </a:p>
+        </p:txBody>
+      </p:sp>
+      <p:sp>
+        <p:nvSpPr>
+          <p:cNvPr id="6" name="Content Placeholder 5"/>
+          <p:cNvSpPr>
+            <a:spLocks noGrp="1"/>
+          </p:cNvSpPr>
+          <p:nvPr>
+            <p:ph sz="half" idx="2"/>
+          </p:nvPr>
+        </p:nvSpPr>
+        <p:spPr>
+          <a:xfrm>
+            <a:off x="4648200" y="381000"/>
+            <a:ext cx="4038600" cy="5745163"/>
+          </a:xfrm>
+        </p:spPr>
+        <p:txBody>
+          <a:bodyPr/>
+          <a:lstStyle/>
+          <a:p>
+            <a:pPr algn="ctr">
+              <a:buNone/>
+            </a:pPr>
+            <a:r>
+              <a:rPr lang="en-US" dirty="0" smtClean="0"/>
+              <a:t>Andy </a:t>
+            </a:r>
+            <a:r>
+              <a:rPr lang="en-US" dirty="0" smtClean="0"/>
+              <a:t>Vida</a:t>
+            </a:r>
+          </a:p>
+          <a:p>
+            <a:pPr algn="ctr">
+              <a:buNone/>
+            </a:pPr>
+            <a:endParaRPr lang="en-US" sz="1600" dirty="0" smtClean="0"/>
+          </a:p>
+          <a:p>
+            <a:pPr marL="0" indent="0">
+              <a:buNone/>
+            </a:pPr>
+            <a:r>
+              <a:rPr lang="en-US" sz="1600" dirty="0" smtClean="0">
+                <a:hlinkClick r:id="rId3"/>
+              </a:rPr>
+              <a:t>vidaa@grangeinsurance.com</a:t>
+            </a:r>
+            <a:endParaRPr lang="en-US" sz="1600" dirty="0" smtClean="0"/>
+          </a:p>
+          <a:p>
+            <a:pPr marL="0" indent="0">
+              <a:buNone/>
+            </a:pPr>
+            <a:r>
+              <a:rPr lang="en-US" sz="1600" dirty="0" smtClean="0"/>
+              <a:t>614-445-2784</a:t>
+            </a:r>
+            <a:endParaRPr lang="en-US" sz="1600" dirty="0" smtClean="0"/>
+          </a:p>
+          <a:p>
+            <a:pPr>
+              <a:buNone/>
+            </a:pPr>
+            <a:endParaRPr lang="en-US" dirty="0"/>
+          </a:p>
+        </p:txBody>
+      </p:sp>
+    </p:spTree>
+  </p:cSld>
+  <p:clrMapOvr>
+    <a:masterClrMapping/>
+  </p:clrMapOvr>
+  <p:timing>
+    <p:tnLst>
+      <p:par>
+        <p:cTn id="1" dur="indefinite" restart="never" nodeType="tmRoot"/>
+      </p:par>
+    </p:tnLst>
+  </p:timing>
 </p:sld>
 </file>
 
@@ -3592,6 +4095,13 @@
   <p:clrMapOvr>
     <a:masterClrMapping/>
   </p:clrMapOvr>
+  <p:timing>
+    <p:tnLst>
+      <p:par>
+        <p:cTn id="1" dur="indefinite" restart="never" nodeType="tmRoot"/>
+      </p:par>
+    </p:tnLst>
+  </p:timing>
 </p:sld>
 </file>
 
@@ -3674,6 +4184,13 @@
   <p:clrMapOvr>
     <a:masterClrMapping/>
   </p:clrMapOvr>
+  <p:timing>
+    <p:tnLst>
+      <p:par>
+        <p:cTn id="1" dur="indefinite" restart="never" nodeType="tmRoot"/>
+      </p:par>
+    </p:tnLst>
+  </p:timing>
 </p:sld>
 </file>
 
@@ -3696,9 +4213,9 @@
       </p:grpSpPr>
       <p:sp>
         <p:nvSpPr>
-          <p:cNvPr id="3074" name="Rectangle 2"/>
-          <p:cNvSpPr>
-            <a:spLocks noGrp="1" noChangeArrowheads="1"/>
+          <p:cNvPr id="2" name="Title 1"/>
+          <p:cNvSpPr>
+            <a:spLocks noGrp="1"/>
           </p:cNvSpPr>
           <p:nvPr>
             <p:ph type="title"/>
@@ -3710,249 +4227,61 @@
           <a:lstStyle/>
           <a:p>
             <a:r>
-              <a:rPr lang="en-US" dirty="0"/>
-              <a:t>Scoring Bowling.</a:t>
-            </a:r>
-          </a:p>
-        </p:txBody>
-      </p:sp>
-      <p:graphicFrame>
-        <p:nvGraphicFramePr>
-          <p:cNvPr id="3084" name="Object 12"/>
-          <p:cNvGraphicFramePr>
-            <a:graphicFrameLocks noGrp="1" noChangeAspect="1"/>
-          </p:cNvGraphicFramePr>
+              <a:rPr lang="en-US" dirty="0" smtClean="0"/>
+              <a:t>Cucumber</a:t>
+            </a:r>
+            <a:endParaRPr lang="en-US" dirty="0"/>
+          </a:p>
+        </p:txBody>
+      </p:sp>
+      <p:sp>
+        <p:nvSpPr>
+          <p:cNvPr id="3" name="Content Placeholder 2"/>
+          <p:cNvSpPr>
+            <a:spLocks noGrp="1"/>
+          </p:cNvSpPr>
           <p:nvPr>
             <p:ph idx="1"/>
           </p:nvPr>
-        </p:nvGraphicFramePr>
-        <p:xfrm>
-          <a:off x="2209800" y="1295400"/>
-          <a:ext cx="4724400" cy="465138"/>
-        </p:xfrm>
-        <a:graphic>
-          <a:graphicData uri="http://schemas.openxmlformats.org/presentationml/2006/ole">
-            <mc:AlternateContent xmlns:mc="http://schemas.openxmlformats.org/markup-compatibility/2006">
-              <mc:Choice xmlns:v="urn:schemas-microsoft-com:vml" Requires="v">
-                <p:oleObj spid="_x0000_s1029" name="VISIO" r:id="rId4" imgW="2544803" imgH="251238" progId="Visio.Drawing.5">
-                  <p:embed/>
-                </p:oleObj>
-              </mc:Choice>
-              <mc:Fallback>
-                <p:oleObj name="VISIO" r:id="rId4" imgW="2544803" imgH="251238" progId="Visio.Drawing.5">
-                  <p:embed/>
-                  <p:pic>
-                    <p:nvPicPr>
-                      <p:cNvPr id="0" name="Picture 2"/>
-                      <p:cNvPicPr>
-                        <a:picLocks noChangeAspect="1" noChangeArrowheads="1"/>
-                      </p:cNvPicPr>
-                      <p:nvPr/>
-                    </p:nvPicPr>
-                    <p:blipFill>
-                      <a:blip r:embed="rId5">
-                        <a:extLst>
-                          <a:ext uri="{28A0092B-C50C-407E-A947-70E740481C1C}">
-                            <a14:useLocalDpi xmlns:a14="http://schemas.microsoft.com/office/drawing/2010/main" val="0"/>
-                          </a:ext>
-                        </a:extLst>
-                      </a:blip>
-                      <a:srcRect/>
-                      <a:stretch>
-                        <a:fillRect/>
-                      </a:stretch>
-                    </p:blipFill>
-                    <p:spPr bwMode="auto">
-                      <a:xfrm>
-                        <a:off x="2209800" y="1295400"/>
-                        <a:ext cx="4724400" cy="465138"/>
-                      </a:xfrm>
-                      <a:prstGeom prst="rect">
-                        <a:avLst/>
-                      </a:prstGeom>
-                      <a:noFill/>
-                      <a:ln>
-                        <a:noFill/>
-                      </a:ln>
-                      <a:effectLst/>
-                      <a:extLst>
-                        <a:ext uri="{909E8E84-426E-40dd-AFC4-6F175D3DCCD1}">
-                          <a14:hiddenFill xmlns:a14="http://schemas.microsoft.com/office/drawing/2010/main">
-                            <a:solidFill>
-                              <a:schemeClr val="accent1"/>
-                            </a:solidFill>
-                          </a14:hiddenFill>
-                        </a:ext>
-                        <a:ext uri="{91240B29-F687-4f45-9708-019B960494DF}">
-                          <a14:hiddenLine xmlns:a14="http://schemas.microsoft.com/office/drawing/2010/main" w="9525">
-                            <a:solidFill>
-                              <a:schemeClr val="tx1"/>
-                            </a:solidFill>
-                            <a:miter lim="800000"/>
-                            <a:headEnd/>
-                            <a:tailEnd/>
-                          </a14:hiddenLine>
-                        </a:ext>
-                        <a:ext uri="{AF507438-7753-43e0-B8FC-AC1667EBCBE1}">
-                          <a14:hiddenEffects xmlns:a14="http://schemas.microsoft.com/office/drawing/2010/main">
-                            <a:effectLst>
-                              <a:outerShdw blurRad="63500" dist="38099" dir="2700000" algn="ctr" rotWithShape="0">
-                                <a:schemeClr val="bg2">
-                                  <a:alpha val="74998"/>
-                                </a:schemeClr>
-                              </a:outerShdw>
-                            </a:effectLst>
-                          </a14:hiddenEffects>
-                        </a:ext>
-                      </a:extLst>
-                    </p:spPr>
-                  </p:pic>
-                </p:oleObj>
-              </mc:Fallback>
-            </mc:AlternateContent>
-          </a:graphicData>
-        </a:graphic>
-      </p:graphicFrame>
-      <p:sp>
-        <p:nvSpPr>
-          <p:cNvPr id="3086" name="Text Box 14"/>
-          <p:cNvSpPr txBox="1">
-            <a:spLocks noChangeArrowheads="1"/>
-          </p:cNvSpPr>
-          <p:nvPr/>
-        </p:nvSpPr>
-        <p:spPr bwMode="auto">
-          <a:xfrm>
-            <a:off x="441325" y="2017713"/>
-            <a:ext cx="8235950" cy="4211637"/>
-          </a:xfrm>
-          <a:prstGeom prst="rect">
-            <a:avLst/>
-          </a:prstGeom>
-          <a:noFill/>
-          <a:ln w="9525">
-            <a:noFill/>
-            <a:miter lim="800000"/>
-            <a:headEnd/>
-            <a:tailEnd/>
-          </a:ln>
-          <a:effectLst/>
-        </p:spPr>
-        <p:txBody>
-          <a:bodyPr wrap="none">
-            <a:spAutoFit/>
+        </p:nvSpPr>
+        <p:spPr/>
+        <p:txBody>
+          <a:bodyPr>
+            <a:normAutofit/>
           </a:bodyPr>
           <a:lstStyle/>
           <a:p>
             <a:r>
-              <a:rPr lang="en-US" dirty="0">
-                <a:latin typeface="Arial" charset="0"/>
-              </a:rPr>
-              <a:t>The game consists of 10 frames as shown above.  In each frame the player has</a:t>
-            </a:r>
-          </a:p>
-          <a:p>
-            <a:r>
-              <a:rPr lang="en-US" dirty="0">
-                <a:latin typeface="Arial" charset="0"/>
-              </a:rPr>
-              <a:t>two opportunities to knock down 10 pins.  The score for the frame is the total</a:t>
-            </a:r>
-          </a:p>
-          <a:p>
-            <a:r>
-              <a:rPr lang="en-US" dirty="0">
-                <a:latin typeface="Arial" charset="0"/>
-              </a:rPr>
-              <a:t>number of pins knocked down, plus bonuses for strikes and spares.</a:t>
-            </a:r>
-          </a:p>
-          <a:p>
-            <a:endParaRPr lang="en-US" dirty="0">
-              <a:latin typeface="Arial" charset="0"/>
-            </a:endParaRPr>
-          </a:p>
-          <a:p>
-            <a:r>
-              <a:rPr lang="en-US" dirty="0">
-                <a:latin typeface="Arial" charset="0"/>
-              </a:rPr>
-              <a:t>A spare is when the player knocks down all 10 pins in two tries.  The bonus for</a:t>
-            </a:r>
-          </a:p>
-          <a:p>
-            <a:r>
-              <a:rPr lang="en-US" dirty="0">
-                <a:latin typeface="Arial" charset="0"/>
-              </a:rPr>
-              <a:t>that frame is the number of pins knocked down by the next roll.  So in frame 3</a:t>
-            </a:r>
-          </a:p>
-          <a:p>
-            <a:r>
-              <a:rPr lang="en-US" dirty="0">
-                <a:latin typeface="Arial" charset="0"/>
-              </a:rPr>
-              <a:t>above, the score is 10 (the total number knocked down) plus a bonus of 5 (the</a:t>
-            </a:r>
-          </a:p>
-          <a:p>
-            <a:r>
-              <a:rPr lang="en-US" dirty="0">
-                <a:latin typeface="Arial" charset="0"/>
-              </a:rPr>
-              <a:t>number of pins knocked down on the next roll.)</a:t>
-            </a:r>
-          </a:p>
-          <a:p>
-            <a:endParaRPr lang="en-US" dirty="0">
-              <a:latin typeface="Arial" charset="0"/>
-            </a:endParaRPr>
-          </a:p>
-          <a:p>
-            <a:r>
-              <a:rPr lang="en-US" dirty="0">
-                <a:latin typeface="Arial" charset="0"/>
-              </a:rPr>
-              <a:t>A strike is when the player knocks down all 10 pins on his first try.  The bonus</a:t>
-            </a:r>
-          </a:p>
-          <a:p>
-            <a:r>
-              <a:rPr lang="en-US" dirty="0">
-                <a:latin typeface="Arial" charset="0"/>
-              </a:rPr>
-              <a:t>for that frame is the value of the next two balls rolled.</a:t>
-            </a:r>
-          </a:p>
-          <a:p>
-            <a:endParaRPr lang="en-US" dirty="0">
-              <a:latin typeface="Arial" charset="0"/>
-            </a:endParaRPr>
-          </a:p>
-          <a:p>
-            <a:r>
-              <a:rPr lang="en-US" dirty="0">
-                <a:latin typeface="Arial" charset="0"/>
-              </a:rPr>
-              <a:t>In the tenth frame a player who rolls a spare or strike is allowed to roll the extra</a:t>
-            </a:r>
-          </a:p>
-          <a:p>
-            <a:r>
-              <a:rPr lang="en-US" dirty="0">
-                <a:latin typeface="Arial" charset="0"/>
-              </a:rPr>
-              <a:t>balls to complete the frame.  However no more than three balls can be rolled in</a:t>
-            </a:r>
-          </a:p>
-          <a:p>
-            <a:r>
-              <a:rPr lang="en-US" dirty="0">
-                <a:latin typeface="Arial" charset="0"/>
-              </a:rPr>
-              <a:t>tenth frame.</a:t>
-            </a:r>
+              <a:rPr lang="en-US" sz="2400" dirty="0" smtClean="0"/>
+              <a:t>Describes how software should behave in plain text</a:t>
+            </a:r>
+          </a:p>
+          <a:p>
+            <a:r>
+              <a:rPr lang="en-US" sz="2400" dirty="0" smtClean="0"/>
+              <a:t>Gherkin</a:t>
+            </a:r>
+          </a:p>
+          <a:p>
+            <a:pPr lvl="1"/>
+            <a:r>
+              <a:rPr lang="en-US" sz="2000" dirty="0" smtClean="0"/>
+              <a:t>Usable in many different human languages (even LOLZ!)</a:t>
+            </a:r>
+          </a:p>
+          <a:p>
+            <a:pPr lvl="1"/>
+            <a:r>
+              <a:rPr lang="en-US" sz="2000" dirty="0" smtClean="0"/>
+              <a:t>Features can be written and understood by both non/technical project members</a:t>
+            </a:r>
+          </a:p>
+          <a:p>
+            <a:r>
+              <a:rPr lang="en-US" sz="2400" dirty="0" smtClean="0"/>
+              <a:t>Not a replacement for unit testing; it’s not a low level testing/spec framework</a:t>
+            </a:r>
+            <a:endParaRPr lang="en-US" sz="2400" dirty="0"/>
           </a:p>
         </p:txBody>
       </p:sp>
@@ -3961,6 +4290,13 @@
   <p:clrMapOvr>
     <a:masterClrMapping/>
   </p:clrMapOvr>
+  <p:timing>
+    <p:tnLst>
+      <p:par>
+        <p:cTn id="1" dur="indefinite" restart="never" nodeType="tmRoot"/>
+      </p:par>
+    </p:tnLst>
+  </p:timing>
 </p:sld>
 </file>
 
@@ -3983,95 +4319,165 @@
       </p:grpSpPr>
       <p:sp>
         <p:nvSpPr>
-          <p:cNvPr id="5" name="Content Placeholder 4"/>
-          <p:cNvSpPr>
-            <a:spLocks noGrp="1"/>
-          </p:cNvSpPr>
-          <p:nvPr>
-            <p:ph sz="half" idx="1"/>
-          </p:nvPr>
-        </p:nvSpPr>
-        <p:spPr>
-          <a:xfrm>
-            <a:off x="457200" y="381000"/>
-            <a:ext cx="4038600" cy="5745163"/>
-          </a:xfrm>
-        </p:spPr>
-        <p:txBody>
-          <a:bodyPr/>
-          <a:lstStyle/>
-          <a:p>
-            <a:pPr marL="0" indent="0" algn="ctr">
+          <p:cNvPr id="2" name="Title 1"/>
+          <p:cNvSpPr>
+            <a:spLocks noGrp="1"/>
+          </p:cNvSpPr>
+          <p:nvPr>
+            <p:ph type="title"/>
+          </p:nvPr>
+        </p:nvSpPr>
+        <p:spPr/>
+        <p:txBody>
+          <a:bodyPr/>
+          <a:lstStyle/>
+          <a:p>
+            <a:r>
+              <a:rPr lang="en-US" dirty="0" smtClean="0"/>
+              <a:t>Features</a:t>
+            </a:r>
+            <a:endParaRPr lang="en-US" dirty="0"/>
+          </a:p>
+        </p:txBody>
+      </p:sp>
+      <p:sp>
+        <p:nvSpPr>
+          <p:cNvPr id="3" name="Content Placeholder 2"/>
+          <p:cNvSpPr>
+            <a:spLocks noGrp="1"/>
+          </p:cNvSpPr>
+          <p:nvPr>
+            <p:ph idx="1"/>
+          </p:nvPr>
+        </p:nvSpPr>
+        <p:spPr/>
+        <p:txBody>
+          <a:bodyPr>
+            <a:normAutofit/>
+          </a:bodyPr>
+          <a:lstStyle/>
+          <a:p>
+            <a:r>
+              <a:rPr lang="en-US" sz="2400" dirty="0" smtClean="0"/>
+              <a:t>Something that your software does (or should do)</a:t>
+            </a:r>
+          </a:p>
+          <a:p>
+            <a:r>
+              <a:rPr lang="en-US" sz="2400" dirty="0" smtClean="0"/>
+              <a:t>Corresponds to a user story </a:t>
+            </a:r>
+          </a:p>
+          <a:p>
+            <a:r>
+              <a:rPr lang="en-US" sz="2400" dirty="0" smtClean="0"/>
+              <a:t>Executable Requirements</a:t>
+            </a:r>
+          </a:p>
+          <a:p>
+            <a:pPr lvl="1"/>
+            <a:r>
+              <a:rPr lang="en-US" sz="1800" dirty="0" smtClean="0"/>
+              <a:t>Documentation of the system</a:t>
+            </a:r>
+          </a:p>
+          <a:p>
+            <a:pPr lvl="1"/>
+            <a:r>
+              <a:rPr lang="en-US" sz="1800" dirty="0" smtClean="0"/>
+              <a:t>Automated tests</a:t>
+            </a:r>
+          </a:p>
+          <a:p>
+            <a:pPr lvl="1"/>
+            <a:endParaRPr lang="en-US" sz="1800" dirty="0" smtClean="0"/>
+          </a:p>
+          <a:p>
+            <a:r>
+              <a:rPr lang="en-US" sz="2400" dirty="0" smtClean="0"/>
+              <a:t>General Format:</a:t>
+            </a:r>
+          </a:p>
+          <a:p>
+            <a:pPr lvl="1">
               <a:buNone/>
             </a:pPr>
             <a:r>
-              <a:rPr lang="en-US" dirty="0" smtClean="0"/>
-              <a:t>Shawn Wallace</a:t>
-            </a:r>
-          </a:p>
-          <a:p>
-            <a:pPr marL="0" indent="0">
+              <a:rPr lang="en-US" sz="1800" dirty="0" smtClean="0"/>
+              <a:t>    Feature</a:t>
+            </a:r>
+            <a:r>
+              <a:rPr lang="en-US" sz="1800" dirty="0" smtClean="0"/>
+              <a:t>: &lt;short description&gt;</a:t>
+            </a:r>
+          </a:p>
+          <a:p>
+            <a:pPr lvl="1">
               <a:buNone/>
             </a:pPr>
-            <a:endParaRPr lang="en-US" sz="1600" dirty="0" smtClean="0"/>
-          </a:p>
-          <a:p>
-            <a:pPr marL="0" indent="0">
+            <a:r>
+              <a:rPr lang="en-US" sz="1800" dirty="0" smtClean="0"/>
+              <a:t>  </a:t>
+            </a:r>
+            <a:r>
+              <a:rPr lang="en-US" sz="1800" dirty="0" smtClean="0"/>
+              <a:t>       &lt;</a:t>
+            </a:r>
+            <a:r>
+              <a:rPr lang="en-US" sz="1800" dirty="0" smtClean="0"/>
+              <a:t>story&gt;</a:t>
+            </a:r>
+          </a:p>
+          <a:p>
+            <a:pPr lvl="1">
               <a:buNone/>
             </a:pPr>
             <a:r>
-              <a:rPr lang="en-US" sz="1600" dirty="0" smtClean="0">
-                <a:hlinkClick r:id="rId2"/>
-              </a:rPr>
-              <a:t>c-wallas@grangeinsurance.com</a:t>
-            </a:r>
-            <a:endParaRPr lang="en-US" sz="1600" dirty="0" smtClean="0"/>
-          </a:p>
-          <a:p>
-            <a:pPr marL="0" indent="0">
+              <a:rPr lang="en-US" sz="1800" dirty="0" smtClean="0"/>
+              <a:t> </a:t>
+            </a:r>
+            <a:r>
+              <a:rPr lang="en-US" sz="1800" dirty="0" smtClean="0"/>
+              <a:t>       </a:t>
+            </a:r>
+            <a:r>
+              <a:rPr lang="en-US" sz="1800" dirty="0" smtClean="0"/>
+              <a:t>&lt;scenario 1&gt;</a:t>
+            </a:r>
+          </a:p>
+          <a:p>
+            <a:pPr lvl="1">
               <a:buNone/>
             </a:pPr>
             <a:r>
-              <a:rPr lang="en-US" sz="1600" dirty="0" smtClean="0"/>
-              <a:t>614.270-1600</a:t>
-            </a:r>
-            <a:endParaRPr lang="en-US" sz="1600" dirty="0"/>
-          </a:p>
-        </p:txBody>
-      </p:sp>
-      <p:sp>
-        <p:nvSpPr>
-          <p:cNvPr id="6" name="Content Placeholder 5"/>
-          <p:cNvSpPr>
-            <a:spLocks noGrp="1"/>
-          </p:cNvSpPr>
-          <p:nvPr>
-            <p:ph sz="half" idx="2"/>
-          </p:nvPr>
-        </p:nvSpPr>
-        <p:spPr>
-          <a:xfrm>
-            <a:off x="4648200" y="381000"/>
-            <a:ext cx="4038600" cy="5745163"/>
-          </a:xfrm>
-        </p:spPr>
-        <p:txBody>
-          <a:bodyPr/>
-          <a:lstStyle/>
-          <a:p>
-            <a:pPr algn="ctr">
+              <a:rPr lang="en-US" sz="1800" dirty="0" smtClean="0"/>
+              <a:t>  </a:t>
+            </a:r>
+            <a:r>
+              <a:rPr lang="en-US" sz="1800" dirty="0" smtClean="0"/>
+              <a:t>       ...</a:t>
+            </a:r>
+            <a:endParaRPr lang="en-US" sz="1800" dirty="0" smtClean="0"/>
+          </a:p>
+          <a:p>
+            <a:pPr lvl="1">
               <a:buNone/>
             </a:pPr>
             <a:r>
-              <a:rPr lang="en-US" dirty="0" smtClean="0"/>
-              <a:t>Andy Vida</a:t>
-            </a:r>
-          </a:p>
-          <a:p>
-            <a:pPr>
-              <a:buNone/>
-            </a:pPr>
-            <a:endParaRPr lang="en-US" dirty="0"/>
+              <a:rPr lang="en-US" sz="1800" dirty="0" smtClean="0"/>
+              <a:t> </a:t>
+            </a:r>
+            <a:r>
+              <a:rPr lang="en-US" sz="1800" dirty="0" smtClean="0"/>
+              <a:t>       </a:t>
+            </a:r>
+            <a:r>
+              <a:rPr lang="en-US" sz="1800" dirty="0" smtClean="0"/>
+              <a:t>&lt;scenario n&gt;</a:t>
+            </a:r>
+          </a:p>
+          <a:p>
+            <a:endParaRPr lang="en-US" sz="2000" dirty="0" smtClean="0"/>
           </a:p>
         </p:txBody>
       </p:sp>
@@ -4080,6 +4486,654 @@
   <p:clrMapOvr>
     <a:masterClrMapping/>
   </p:clrMapOvr>
+  <p:timing>
+    <p:tnLst>
+      <p:par>
+        <p:cTn id="1" dur="indefinite" restart="never" nodeType="tmRoot"/>
+      </p:par>
+    </p:tnLst>
+  </p:timing>
+</p:sld>
+</file>
+
+<file path=ppt/slides/slide6.xml><?xml version="1.0" encoding="utf-8"?>
+<p:sld xmlns:a="http://schemas.openxmlformats.org/drawingml/2006/main" xmlns:r="http://schemas.openxmlformats.org/officeDocument/2006/relationships" xmlns:p="http://schemas.openxmlformats.org/presentationml/2006/main">
+  <p:cSld>
+    <p:spTree>
+      <p:nvGrpSpPr>
+        <p:cNvPr id="1" name=""/>
+        <p:cNvGrpSpPr/>
+        <p:nvPr/>
+      </p:nvGrpSpPr>
+      <p:grpSpPr>
+        <a:xfrm>
+          <a:off x="0" y="0"/>
+          <a:ext cx="0" cy="0"/>
+          <a:chOff x="0" y="0"/>
+          <a:chExt cx="0" cy="0"/>
+        </a:xfrm>
+      </p:grpSpPr>
+      <p:sp>
+        <p:nvSpPr>
+          <p:cNvPr id="2" name="Title 1"/>
+          <p:cNvSpPr>
+            <a:spLocks noGrp="1"/>
+          </p:cNvSpPr>
+          <p:nvPr>
+            <p:ph type="title"/>
+          </p:nvPr>
+        </p:nvSpPr>
+        <p:spPr/>
+        <p:txBody>
+          <a:bodyPr/>
+          <a:lstStyle/>
+          <a:p>
+            <a:r>
+              <a:rPr lang="en-US" dirty="0" smtClean="0"/>
+              <a:t>Features</a:t>
+            </a:r>
+            <a:endParaRPr lang="en-US" dirty="0"/>
+          </a:p>
+        </p:txBody>
+      </p:sp>
+      <p:sp>
+        <p:nvSpPr>
+          <p:cNvPr id="3" name="Content Placeholder 2"/>
+          <p:cNvSpPr>
+            <a:spLocks noGrp="1"/>
+          </p:cNvSpPr>
+          <p:nvPr>
+            <p:ph idx="1"/>
+          </p:nvPr>
+        </p:nvSpPr>
+        <p:spPr/>
+        <p:txBody>
+          <a:bodyPr/>
+          <a:lstStyle/>
+          <a:p>
+            <a:r>
+              <a:rPr lang="en-US" dirty="0" smtClean="0"/>
+              <a:t>Who’s using the system?</a:t>
+            </a:r>
+          </a:p>
+          <a:p>
+            <a:r>
+              <a:rPr lang="en-US" dirty="0" smtClean="0"/>
+              <a:t>What are they doing?</a:t>
+            </a:r>
+          </a:p>
+          <a:p>
+            <a:r>
+              <a:rPr lang="en-US" dirty="0" smtClean="0"/>
+              <a:t>Why do they care?</a:t>
+            </a:r>
+          </a:p>
+          <a:p>
+            <a:endParaRPr lang="en-US" dirty="0" smtClean="0"/>
+          </a:p>
+          <a:p>
+            <a:pPr>
+              <a:buNone/>
+            </a:pPr>
+            <a:r>
+              <a:rPr lang="en-US" dirty="0" smtClean="0"/>
+              <a:t>	</a:t>
+            </a:r>
+            <a:r>
+              <a:rPr lang="en-US" i="1" dirty="0" smtClean="0"/>
+              <a:t>As a &lt;role&gt;</a:t>
+            </a:r>
+          </a:p>
+          <a:p>
+            <a:pPr>
+              <a:buNone/>
+            </a:pPr>
+            <a:r>
+              <a:rPr lang="en-US" i="1" dirty="0" smtClean="0"/>
+              <a:t>	I want &lt;feature&gt;</a:t>
+            </a:r>
+          </a:p>
+          <a:p>
+            <a:pPr>
+              <a:buNone/>
+            </a:pPr>
+            <a:r>
+              <a:rPr lang="en-US" i="1" dirty="0" smtClean="0"/>
+              <a:t>	</a:t>
+            </a:r>
+            <a:r>
+              <a:rPr lang="en-US" i="1" dirty="0" smtClean="0"/>
+              <a:t>So that &lt;business value&gt;</a:t>
+            </a:r>
+            <a:endParaRPr lang="en-US" i="1" dirty="0"/>
+          </a:p>
+        </p:txBody>
+      </p:sp>
+    </p:spTree>
+  </p:cSld>
+  <p:clrMapOvr>
+    <a:masterClrMapping/>
+  </p:clrMapOvr>
+  <p:timing>
+    <p:tnLst>
+      <p:par>
+        <p:cTn id="1" dur="indefinite" restart="never" nodeType="tmRoot"/>
+      </p:par>
+    </p:tnLst>
+  </p:timing>
+</p:sld>
+</file>
+
+<file path=ppt/slides/slide7.xml><?xml version="1.0" encoding="utf-8"?>
+<p:sld xmlns:a="http://schemas.openxmlformats.org/drawingml/2006/main" xmlns:r="http://schemas.openxmlformats.org/officeDocument/2006/relationships" xmlns:p="http://schemas.openxmlformats.org/presentationml/2006/main">
+  <p:cSld>
+    <p:spTree>
+      <p:nvGrpSpPr>
+        <p:cNvPr id="1" name=""/>
+        <p:cNvGrpSpPr/>
+        <p:nvPr/>
+      </p:nvGrpSpPr>
+      <p:grpSpPr>
+        <a:xfrm>
+          <a:off x="0" y="0"/>
+          <a:ext cx="0" cy="0"/>
+          <a:chOff x="0" y="0"/>
+          <a:chExt cx="0" cy="0"/>
+        </a:xfrm>
+      </p:grpSpPr>
+      <p:sp>
+        <p:nvSpPr>
+          <p:cNvPr id="2" name="Title 1"/>
+          <p:cNvSpPr>
+            <a:spLocks noGrp="1"/>
+          </p:cNvSpPr>
+          <p:nvPr>
+            <p:ph type="title"/>
+          </p:nvPr>
+        </p:nvSpPr>
+        <p:spPr/>
+        <p:txBody>
+          <a:bodyPr/>
+          <a:lstStyle/>
+          <a:p>
+            <a:r>
+              <a:rPr lang="en-US" dirty="0" smtClean="0"/>
+              <a:t>Scenarios</a:t>
+            </a:r>
+            <a:endParaRPr lang="en-US" dirty="0"/>
+          </a:p>
+        </p:txBody>
+      </p:sp>
+      <p:sp>
+        <p:nvSpPr>
+          <p:cNvPr id="3" name="Content Placeholder 2"/>
+          <p:cNvSpPr>
+            <a:spLocks noGrp="1"/>
+          </p:cNvSpPr>
+          <p:nvPr>
+            <p:ph idx="1"/>
+          </p:nvPr>
+        </p:nvSpPr>
+        <p:spPr/>
+        <p:txBody>
+          <a:bodyPr>
+            <a:normAutofit fontScale="92500" lnSpcReduction="10000"/>
+          </a:bodyPr>
+          <a:lstStyle/>
+          <a:p>
+            <a:r>
+              <a:rPr lang="en-US" dirty="0" smtClean="0"/>
+              <a:t>Features are defined by one or more scenarios</a:t>
+            </a:r>
+          </a:p>
+          <a:p>
+            <a:r>
+              <a:rPr lang="en-US" dirty="0" smtClean="0"/>
+              <a:t>Sequence of steps thru the feature that exercises on path</a:t>
+            </a:r>
+          </a:p>
+          <a:p>
+            <a:r>
+              <a:rPr lang="en-US" dirty="0" smtClean="0"/>
+              <a:t>Use BDD style – </a:t>
+            </a:r>
+            <a:r>
+              <a:rPr lang="en-US" i="1" dirty="0" smtClean="0"/>
+              <a:t>given-when-then</a:t>
+            </a:r>
+          </a:p>
+          <a:p>
+            <a:pPr>
+              <a:buNone/>
+            </a:pPr>
+            <a:endParaRPr lang="en-US" i="1" dirty="0" smtClean="0"/>
+          </a:p>
+          <a:p>
+            <a:pPr>
+              <a:buNone/>
+            </a:pPr>
+            <a:r>
+              <a:rPr lang="en-US" i="1" dirty="0" smtClean="0"/>
+              <a:t>	Scenario: &lt;description&gt;</a:t>
+            </a:r>
+          </a:p>
+          <a:p>
+            <a:pPr>
+              <a:buNone/>
+            </a:pPr>
+            <a:r>
+              <a:rPr lang="en-US" i="1" dirty="0" smtClean="0"/>
+              <a:t>	</a:t>
+            </a:r>
+            <a:r>
+              <a:rPr lang="en-US" i="1" dirty="0" smtClean="0"/>
+              <a:t>	&lt;step 1&gt;</a:t>
+            </a:r>
+          </a:p>
+          <a:p>
+            <a:pPr>
+              <a:buNone/>
+            </a:pPr>
+            <a:r>
+              <a:rPr lang="en-US" i="1" dirty="0" smtClean="0"/>
+              <a:t>	</a:t>
+            </a:r>
+            <a:r>
+              <a:rPr lang="en-US" i="1" dirty="0" smtClean="0"/>
+              <a:t>	…</a:t>
+            </a:r>
+          </a:p>
+          <a:p>
+            <a:pPr>
+              <a:buNone/>
+            </a:pPr>
+            <a:r>
+              <a:rPr lang="en-US" i="1" dirty="0" smtClean="0"/>
+              <a:t>	</a:t>
+            </a:r>
+            <a:r>
+              <a:rPr lang="en-US" i="1" dirty="0" smtClean="0"/>
+              <a:t>	&lt;step 2&gt;</a:t>
+            </a:r>
+          </a:p>
+          <a:p>
+            <a:pPr>
+              <a:buNone/>
+            </a:pPr>
+            <a:endParaRPr lang="en-US" i="1" dirty="0"/>
+          </a:p>
+        </p:txBody>
+      </p:sp>
+    </p:spTree>
+  </p:cSld>
+  <p:clrMapOvr>
+    <a:masterClrMapping/>
+  </p:clrMapOvr>
+  <p:timing>
+    <p:tnLst>
+      <p:par>
+        <p:cTn id="1" dur="indefinite" restart="never" nodeType="tmRoot"/>
+      </p:par>
+    </p:tnLst>
+  </p:timing>
+</p:sld>
+</file>
+
+<file path=ppt/slides/slide8.xml><?xml version="1.0" encoding="utf-8"?>
+<p:sld xmlns:a="http://schemas.openxmlformats.org/drawingml/2006/main" xmlns:r="http://schemas.openxmlformats.org/officeDocument/2006/relationships" xmlns:p="http://schemas.openxmlformats.org/presentationml/2006/main">
+  <p:cSld>
+    <p:spTree>
+      <p:nvGrpSpPr>
+        <p:cNvPr id="1" name=""/>
+        <p:cNvGrpSpPr/>
+        <p:nvPr/>
+      </p:nvGrpSpPr>
+      <p:grpSpPr>
+        <a:xfrm>
+          <a:off x="0" y="0"/>
+          <a:ext cx="0" cy="0"/>
+          <a:chOff x="0" y="0"/>
+          <a:chExt cx="0" cy="0"/>
+        </a:xfrm>
+      </p:grpSpPr>
+      <p:sp>
+        <p:nvSpPr>
+          <p:cNvPr id="2" name="Title 1"/>
+          <p:cNvSpPr>
+            <a:spLocks noGrp="1"/>
+          </p:cNvSpPr>
+          <p:nvPr>
+            <p:ph type="title"/>
+          </p:nvPr>
+        </p:nvSpPr>
+        <p:spPr/>
+        <p:txBody>
+          <a:bodyPr/>
+          <a:lstStyle/>
+          <a:p>
+            <a:r>
+              <a:rPr lang="en-US" dirty="0" smtClean="0"/>
+              <a:t>Scenarios</a:t>
+            </a:r>
+            <a:endParaRPr lang="en-US" dirty="0"/>
+          </a:p>
+        </p:txBody>
+      </p:sp>
+      <p:sp>
+        <p:nvSpPr>
+          <p:cNvPr id="3" name="Content Placeholder 2"/>
+          <p:cNvSpPr>
+            <a:spLocks noGrp="1"/>
+          </p:cNvSpPr>
+          <p:nvPr>
+            <p:ph idx="1"/>
+          </p:nvPr>
+        </p:nvSpPr>
+        <p:spPr/>
+        <p:txBody>
+          <a:bodyPr>
+            <a:normAutofit lnSpcReduction="10000"/>
+          </a:bodyPr>
+          <a:lstStyle/>
+          <a:p>
+            <a:r>
+              <a:rPr lang="en-US" dirty="0" smtClean="0"/>
+              <a:t>Given</a:t>
+            </a:r>
+          </a:p>
+          <a:p>
+            <a:pPr lvl="1"/>
+            <a:r>
+              <a:rPr lang="en-US" dirty="0" smtClean="0"/>
+              <a:t>Sets up preconditions, or context, for the scenario</a:t>
+            </a:r>
+          </a:p>
+          <a:p>
+            <a:r>
+              <a:rPr lang="en-US" dirty="0" smtClean="0"/>
+              <a:t>When</a:t>
+            </a:r>
+          </a:p>
+          <a:p>
+            <a:pPr lvl="1"/>
+            <a:r>
+              <a:rPr lang="en-US" dirty="0" smtClean="0"/>
+              <a:t>The action, or behavior, that we’re focused on</a:t>
+            </a:r>
+          </a:p>
+          <a:p>
+            <a:r>
+              <a:rPr lang="en-US" dirty="0" smtClean="0"/>
+              <a:t>Then</a:t>
+            </a:r>
+          </a:p>
+          <a:p>
+            <a:pPr lvl="1"/>
+            <a:r>
+              <a:rPr lang="en-US" dirty="0" smtClean="0"/>
+              <a:t>Checks post-conditions</a:t>
+            </a:r>
+          </a:p>
+          <a:p>
+            <a:pPr lvl="1"/>
+            <a:r>
+              <a:rPr lang="en-US" dirty="0" smtClean="0"/>
+              <a:t>Verifies that the right thing happened in the </a:t>
+            </a:r>
+            <a:r>
+              <a:rPr lang="en-US" i="1" dirty="0" smtClean="0"/>
+              <a:t>When</a:t>
+            </a:r>
+            <a:r>
+              <a:rPr lang="en-US" dirty="0" smtClean="0"/>
+              <a:t> stage</a:t>
+            </a:r>
+          </a:p>
+          <a:p>
+            <a:r>
+              <a:rPr lang="en-US" dirty="0" smtClean="0"/>
+              <a:t>And</a:t>
+            </a:r>
+          </a:p>
+          <a:p>
+            <a:pPr lvl="1">
+              <a:buNone/>
+            </a:pPr>
+            <a:endParaRPr lang="en-US" dirty="0"/>
+          </a:p>
+        </p:txBody>
+      </p:sp>
+    </p:spTree>
+  </p:cSld>
+  <p:clrMapOvr>
+    <a:masterClrMapping/>
+  </p:clrMapOvr>
+  <p:timing>
+    <p:tnLst>
+      <p:par>
+        <p:cTn id="1" dur="indefinite" restart="never" nodeType="tmRoot"/>
+      </p:par>
+    </p:tnLst>
+  </p:timing>
+</p:sld>
+</file>
+
+<file path=ppt/slides/slide9.xml><?xml version="1.0" encoding="utf-8"?>
+<p:sld xmlns:a="http://schemas.openxmlformats.org/drawingml/2006/main" xmlns:r="http://schemas.openxmlformats.org/officeDocument/2006/relationships" xmlns:p="http://schemas.openxmlformats.org/presentationml/2006/main">
+  <p:cSld>
+    <p:spTree>
+      <p:nvGrpSpPr>
+        <p:cNvPr id="1" name=""/>
+        <p:cNvGrpSpPr/>
+        <p:nvPr/>
+      </p:nvGrpSpPr>
+      <p:grpSpPr>
+        <a:xfrm>
+          <a:off x="0" y="0"/>
+          <a:ext cx="0" cy="0"/>
+          <a:chOff x="0" y="0"/>
+          <a:chExt cx="0" cy="0"/>
+        </a:xfrm>
+      </p:grpSpPr>
+      <p:sp>
+        <p:nvSpPr>
+          <p:cNvPr id="3074" name="Rectangle 2"/>
+          <p:cNvSpPr>
+            <a:spLocks noGrp="1" noChangeArrowheads="1"/>
+          </p:cNvSpPr>
+          <p:nvPr>
+            <p:ph type="title"/>
+          </p:nvPr>
+        </p:nvSpPr>
+        <p:spPr/>
+        <p:txBody>
+          <a:bodyPr/>
+          <a:lstStyle/>
+          <a:p>
+            <a:r>
+              <a:rPr lang="en-US" dirty="0"/>
+              <a:t>Scoring Bowling.</a:t>
+            </a:r>
+          </a:p>
+        </p:txBody>
+      </p:sp>
+      <p:graphicFrame>
+        <p:nvGraphicFramePr>
+          <p:cNvPr id="3084" name="Object 12"/>
+          <p:cNvGraphicFramePr>
+            <a:graphicFrameLocks noGrp="1" noChangeAspect="1"/>
+          </p:cNvGraphicFramePr>
+          <p:nvPr>
+            <p:ph idx="1"/>
+          </p:nvPr>
+        </p:nvGraphicFramePr>
+        <p:xfrm>
+          <a:off x="2209800" y="1295400"/>
+          <a:ext cx="4724400" cy="465138"/>
+        </p:xfrm>
+        <a:graphic>
+          <a:graphicData uri="http://schemas.openxmlformats.org/presentationml/2006/ole">
+            <p:oleObj spid="_x0000_s1029" name="VISIO" r:id="rId4" imgW="2066400" imgH="203760" progId="Visio.Drawing.11">
+              <p:embed/>
+            </p:oleObj>
+          </a:graphicData>
+        </a:graphic>
+      </p:graphicFrame>
+      <p:sp>
+        <p:nvSpPr>
+          <p:cNvPr id="3086" name="Text Box 14"/>
+          <p:cNvSpPr txBox="1">
+            <a:spLocks noChangeArrowheads="1"/>
+          </p:cNvSpPr>
+          <p:nvPr/>
+        </p:nvSpPr>
+        <p:spPr bwMode="auto">
+          <a:xfrm>
+            <a:off x="441325" y="2017713"/>
+            <a:ext cx="8235950" cy="4211637"/>
+          </a:xfrm>
+          <a:prstGeom prst="rect">
+            <a:avLst/>
+          </a:prstGeom>
+          <a:noFill/>
+          <a:ln w="9525">
+            <a:noFill/>
+            <a:miter lim="800000"/>
+            <a:headEnd/>
+            <a:tailEnd/>
+          </a:ln>
+          <a:effectLst/>
+        </p:spPr>
+        <p:txBody>
+          <a:bodyPr wrap="none">
+            <a:spAutoFit/>
+          </a:bodyPr>
+          <a:lstStyle/>
+          <a:p>
+            <a:r>
+              <a:rPr lang="en-US" dirty="0">
+                <a:latin typeface="Arial" charset="0"/>
+              </a:rPr>
+              <a:t>The game consists of 10 frames as shown above.  In each frame the player has</a:t>
+            </a:r>
+          </a:p>
+          <a:p>
+            <a:r>
+              <a:rPr lang="en-US" dirty="0">
+                <a:latin typeface="Arial" charset="0"/>
+              </a:rPr>
+              <a:t>two opportunities to knock down 10 pins.  The score for the frame is the total</a:t>
+            </a:r>
+          </a:p>
+          <a:p>
+            <a:r>
+              <a:rPr lang="en-US" dirty="0">
+                <a:latin typeface="Arial" charset="0"/>
+              </a:rPr>
+              <a:t>number of pins knocked down, plus bonuses for strikes and spares.</a:t>
+            </a:r>
+          </a:p>
+          <a:p>
+            <a:endParaRPr lang="en-US" dirty="0">
+              <a:latin typeface="Arial" charset="0"/>
+            </a:endParaRPr>
+          </a:p>
+          <a:p>
+            <a:r>
+              <a:rPr lang="en-US" dirty="0">
+                <a:latin typeface="Arial" charset="0"/>
+              </a:rPr>
+              <a:t>A spare is when the player knocks down all 10 pins in two tries.  The bonus for</a:t>
+            </a:r>
+          </a:p>
+          <a:p>
+            <a:r>
+              <a:rPr lang="en-US" dirty="0">
+                <a:latin typeface="Arial" charset="0"/>
+              </a:rPr>
+              <a:t>that frame is the number of pins knocked down by the next roll.  So in frame 3</a:t>
+            </a:r>
+          </a:p>
+          <a:p>
+            <a:r>
+              <a:rPr lang="en-US" dirty="0">
+                <a:latin typeface="Arial" charset="0"/>
+              </a:rPr>
+              <a:t>above, the score is 10 (the total number knocked down) plus a bonus of 5 (the</a:t>
+            </a:r>
+          </a:p>
+          <a:p>
+            <a:r>
+              <a:rPr lang="en-US" dirty="0">
+                <a:latin typeface="Arial" charset="0"/>
+              </a:rPr>
+              <a:t>number of pins knocked down on the next roll.)</a:t>
+            </a:r>
+          </a:p>
+          <a:p>
+            <a:endParaRPr lang="en-US" dirty="0">
+              <a:latin typeface="Arial" charset="0"/>
+            </a:endParaRPr>
+          </a:p>
+          <a:p>
+            <a:r>
+              <a:rPr lang="en-US" dirty="0">
+                <a:latin typeface="Arial" charset="0"/>
+              </a:rPr>
+              <a:t>A strike is when the player knocks down all 10 pins on his first try.  The bonus</a:t>
+            </a:r>
+          </a:p>
+          <a:p>
+            <a:r>
+              <a:rPr lang="en-US" dirty="0">
+                <a:latin typeface="Arial" charset="0"/>
+              </a:rPr>
+              <a:t>for that frame is the value of the next two balls rolled.</a:t>
+            </a:r>
+          </a:p>
+          <a:p>
+            <a:endParaRPr lang="en-US" dirty="0">
+              <a:latin typeface="Arial" charset="0"/>
+            </a:endParaRPr>
+          </a:p>
+          <a:p>
+            <a:r>
+              <a:rPr lang="en-US" dirty="0">
+                <a:latin typeface="Arial" charset="0"/>
+              </a:rPr>
+              <a:t>In the tenth frame a player who rolls a spare or strike is allowed to roll the extra</a:t>
+            </a:r>
+          </a:p>
+          <a:p>
+            <a:r>
+              <a:rPr lang="en-US" dirty="0">
+                <a:latin typeface="Arial" charset="0"/>
+              </a:rPr>
+              <a:t>balls to complete the frame.  However no more than three balls can be rolled in</a:t>
+            </a:r>
+          </a:p>
+          <a:p>
+            <a:r>
+              <a:rPr lang="en-US" dirty="0">
+                <a:latin typeface="Arial" charset="0"/>
+              </a:rPr>
+              <a:t>tenth frame.</a:t>
+            </a:r>
+          </a:p>
+        </p:txBody>
+      </p:sp>
+    </p:spTree>
+  </p:cSld>
+  <p:clrMapOvr>
+    <a:masterClrMapping/>
+  </p:clrMapOvr>
+  <p:timing>
+    <p:tnLst>
+      <p:par>
+        <p:cTn id="1" dur="indefinite" restart="never" nodeType="tmRoot"/>
+      </p:par>
+    </p:tnLst>
+  </p:timing>
 </p:sld>
 </file>
 

</xml_diff>

<commit_message>
added a couple more cucumber slides
</commit_message>
<xml_diff>
--- a/Presentations/BDD Lunch & Learn.pptx
+++ b/Presentations/BDD Lunch & Learn.pptx
@@ -5,7 +5,7 @@
     <p:sldMasterId id="2147483648" r:id="rId1"/>
   </p:sldMasterIdLst>
   <p:notesMasterIdLst>
-    <p:notesMasterId r:id="rId12"/>
+    <p:notesMasterId r:id="rId14"/>
   </p:notesMasterIdLst>
   <p:sldIdLst>
     <p:sldId id="256" r:id="rId2"/>
@@ -16,8 +16,10 @@
     <p:sldId id="264" r:id="rId7"/>
     <p:sldId id="265" r:id="rId8"/>
     <p:sldId id="266" r:id="rId9"/>
-    <p:sldId id="260" r:id="rId10"/>
-    <p:sldId id="261" r:id="rId11"/>
+    <p:sldId id="268" r:id="rId10"/>
+    <p:sldId id="260" r:id="rId11"/>
+    <p:sldId id="267" r:id="rId12"/>
+    <p:sldId id="261" r:id="rId13"/>
   </p:sldIdLst>
   <p:sldSz cx="9144000" cy="6858000" type="screen4x3"/>
   <p:notesSz cx="6858000" cy="9144000"/>
@@ -373,7 +375,7 @@
     </p:spTree>
     <p:extLst>
       <p:ext uri="{BB962C8B-B14F-4D97-AF65-F5344CB8AC3E}">
-        <p14:creationId xmlns:p14="http://schemas.microsoft.com/office/powerpoint/2010/main" xmlns="" val="3371909597"/>
+        <p14:creationId xmlns="" xmlns:p14="http://schemas.microsoft.com/office/powerpoint/2010/main" val="3371909597"/>
       </p:ext>
     </p:extLst>
   </p:cSld>
@@ -817,7 +819,7 @@
             <a:fld id="{25C56F2C-BDCF-4067-9632-8519D19905E6}" type="slidenum">
               <a:rPr lang="en-US"/>
               <a:pPr/>
-              <a:t>9</a:t>
+              <a:t>10</a:t>
             </a:fld>
             <a:endParaRPr lang="en-US"/>
           </a:p>
@@ -3892,6 +3894,365 @@
       </p:grpSpPr>
       <p:sp>
         <p:nvSpPr>
+          <p:cNvPr id="3074" name="Rectangle 2"/>
+          <p:cNvSpPr>
+            <a:spLocks noGrp="1" noChangeArrowheads="1"/>
+          </p:cNvSpPr>
+          <p:nvPr>
+            <p:ph type="title"/>
+          </p:nvPr>
+        </p:nvSpPr>
+        <p:spPr/>
+        <p:txBody>
+          <a:bodyPr/>
+          <a:lstStyle/>
+          <a:p>
+            <a:r>
+              <a:rPr lang="en-US" dirty="0"/>
+              <a:t>Scoring Bowling.</a:t>
+            </a:r>
+          </a:p>
+        </p:txBody>
+      </p:sp>
+      <p:graphicFrame>
+        <p:nvGraphicFramePr>
+          <p:cNvPr id="3084" name="Object 12"/>
+          <p:cNvGraphicFramePr>
+            <a:graphicFrameLocks noGrp="1" noChangeAspect="1"/>
+          </p:cNvGraphicFramePr>
+          <p:nvPr>
+            <p:ph idx="1"/>
+          </p:nvPr>
+        </p:nvGraphicFramePr>
+        <p:xfrm>
+          <a:off x="2209800" y="1295400"/>
+          <a:ext cx="4724400" cy="465138"/>
+        </p:xfrm>
+        <a:graphic>
+          <a:graphicData uri="http://schemas.openxmlformats.org/presentationml/2006/ole">
+            <p:oleObj spid="_x0000_s1029" name="VISIO" r:id="rId4" imgW="2066400" imgH="203760" progId="Visio.Drawing.11">
+              <p:embed/>
+            </p:oleObj>
+          </a:graphicData>
+        </a:graphic>
+      </p:graphicFrame>
+      <p:sp>
+        <p:nvSpPr>
+          <p:cNvPr id="3086" name="Text Box 14"/>
+          <p:cNvSpPr txBox="1">
+            <a:spLocks noChangeArrowheads="1"/>
+          </p:cNvSpPr>
+          <p:nvPr/>
+        </p:nvSpPr>
+        <p:spPr bwMode="auto">
+          <a:xfrm>
+            <a:off x="441325" y="2017713"/>
+            <a:ext cx="8235950" cy="4211637"/>
+          </a:xfrm>
+          <a:prstGeom prst="rect">
+            <a:avLst/>
+          </a:prstGeom>
+          <a:noFill/>
+          <a:ln w="9525">
+            <a:noFill/>
+            <a:miter lim="800000"/>
+            <a:headEnd/>
+            <a:tailEnd/>
+          </a:ln>
+          <a:effectLst/>
+        </p:spPr>
+        <p:txBody>
+          <a:bodyPr wrap="none">
+            <a:spAutoFit/>
+          </a:bodyPr>
+          <a:lstStyle/>
+          <a:p>
+            <a:r>
+              <a:rPr lang="en-US" dirty="0">
+                <a:latin typeface="Arial" charset="0"/>
+              </a:rPr>
+              <a:t>The game consists of 10 frames as shown above.  In each frame the player has</a:t>
+            </a:r>
+          </a:p>
+          <a:p>
+            <a:r>
+              <a:rPr lang="en-US" dirty="0">
+                <a:latin typeface="Arial" charset="0"/>
+              </a:rPr>
+              <a:t>two opportunities to knock down 10 pins.  The score for the frame is the total</a:t>
+            </a:r>
+          </a:p>
+          <a:p>
+            <a:r>
+              <a:rPr lang="en-US" dirty="0">
+                <a:latin typeface="Arial" charset="0"/>
+              </a:rPr>
+              <a:t>number of pins knocked down, plus bonuses for strikes and spares.</a:t>
+            </a:r>
+          </a:p>
+          <a:p>
+            <a:endParaRPr lang="en-US" dirty="0">
+              <a:latin typeface="Arial" charset="0"/>
+            </a:endParaRPr>
+          </a:p>
+          <a:p>
+            <a:r>
+              <a:rPr lang="en-US" dirty="0">
+                <a:latin typeface="Arial" charset="0"/>
+              </a:rPr>
+              <a:t>A spare is when the player knocks down all 10 pins in two tries.  The bonus for</a:t>
+            </a:r>
+          </a:p>
+          <a:p>
+            <a:r>
+              <a:rPr lang="en-US" dirty="0">
+                <a:latin typeface="Arial" charset="0"/>
+              </a:rPr>
+              <a:t>that frame is the number of pins knocked down by the next roll.  So in frame 3</a:t>
+            </a:r>
+          </a:p>
+          <a:p>
+            <a:r>
+              <a:rPr lang="en-US" dirty="0">
+                <a:latin typeface="Arial" charset="0"/>
+              </a:rPr>
+              <a:t>above, the score is 10 (the total number knocked down) plus a bonus of 5 (the</a:t>
+            </a:r>
+          </a:p>
+          <a:p>
+            <a:r>
+              <a:rPr lang="en-US" dirty="0">
+                <a:latin typeface="Arial" charset="0"/>
+              </a:rPr>
+              <a:t>number of pins knocked down on the next roll.)</a:t>
+            </a:r>
+          </a:p>
+          <a:p>
+            <a:endParaRPr lang="en-US" dirty="0">
+              <a:latin typeface="Arial" charset="0"/>
+            </a:endParaRPr>
+          </a:p>
+          <a:p>
+            <a:r>
+              <a:rPr lang="en-US" dirty="0">
+                <a:latin typeface="Arial" charset="0"/>
+              </a:rPr>
+              <a:t>A strike is when the player knocks down all 10 pins on his first try.  The bonus</a:t>
+            </a:r>
+          </a:p>
+          <a:p>
+            <a:r>
+              <a:rPr lang="en-US" dirty="0">
+                <a:latin typeface="Arial" charset="0"/>
+              </a:rPr>
+              <a:t>for that frame is the value of the next two balls rolled.</a:t>
+            </a:r>
+          </a:p>
+          <a:p>
+            <a:endParaRPr lang="en-US" dirty="0">
+              <a:latin typeface="Arial" charset="0"/>
+            </a:endParaRPr>
+          </a:p>
+          <a:p>
+            <a:r>
+              <a:rPr lang="en-US" dirty="0">
+                <a:latin typeface="Arial" charset="0"/>
+              </a:rPr>
+              <a:t>In the tenth frame a player who rolls a spare or strike is allowed to roll the extra</a:t>
+            </a:r>
+          </a:p>
+          <a:p>
+            <a:r>
+              <a:rPr lang="en-US" dirty="0">
+                <a:latin typeface="Arial" charset="0"/>
+              </a:rPr>
+              <a:t>balls to complete the frame.  However no more than three balls can be rolled in</a:t>
+            </a:r>
+          </a:p>
+          <a:p>
+            <a:r>
+              <a:rPr lang="en-US" dirty="0">
+                <a:latin typeface="Arial" charset="0"/>
+              </a:rPr>
+              <a:t>tenth frame.</a:t>
+            </a:r>
+          </a:p>
+        </p:txBody>
+      </p:sp>
+    </p:spTree>
+  </p:cSld>
+  <p:clrMapOvr>
+    <a:masterClrMapping/>
+  </p:clrMapOvr>
+  <p:timing>
+    <p:tnLst>
+      <p:par>
+        <p:cTn id="1" dur="indefinite" restart="never" nodeType="tmRoot"/>
+      </p:par>
+    </p:tnLst>
+  </p:timing>
+</p:sld>
+</file>
+
+<file path=ppt/slides/slide11.xml><?xml version="1.0" encoding="utf-8"?>
+<p:sld xmlns:a="http://schemas.openxmlformats.org/drawingml/2006/main" xmlns:r="http://schemas.openxmlformats.org/officeDocument/2006/relationships" xmlns:p="http://schemas.openxmlformats.org/presentationml/2006/main">
+  <p:cSld>
+    <p:spTree>
+      <p:nvGrpSpPr>
+        <p:cNvPr id="1" name=""/>
+        <p:cNvGrpSpPr/>
+        <p:nvPr/>
+      </p:nvGrpSpPr>
+      <p:grpSpPr>
+        <a:xfrm>
+          <a:off x="0" y="0"/>
+          <a:ext cx="0" cy="0"/>
+          <a:chOff x="0" y="0"/>
+          <a:chExt cx="0" cy="0"/>
+        </a:xfrm>
+      </p:grpSpPr>
+      <p:sp>
+        <p:nvSpPr>
+          <p:cNvPr id="2" name="Title 1"/>
+          <p:cNvSpPr>
+            <a:spLocks noGrp="1"/>
+          </p:cNvSpPr>
+          <p:nvPr>
+            <p:ph type="title"/>
+          </p:nvPr>
+        </p:nvSpPr>
+        <p:spPr/>
+        <p:txBody>
+          <a:bodyPr/>
+          <a:lstStyle/>
+          <a:p>
+            <a:r>
+              <a:rPr lang="en-US" dirty="0" smtClean="0"/>
+              <a:t>For more info…</a:t>
+            </a:r>
+            <a:endParaRPr lang="en-US" dirty="0"/>
+          </a:p>
+        </p:txBody>
+      </p:sp>
+      <p:sp>
+        <p:nvSpPr>
+          <p:cNvPr id="3" name="Content Placeholder 2"/>
+          <p:cNvSpPr>
+            <a:spLocks noGrp="1"/>
+          </p:cNvSpPr>
+          <p:nvPr>
+            <p:ph idx="1"/>
+          </p:nvPr>
+        </p:nvSpPr>
+        <p:spPr/>
+        <p:txBody>
+          <a:bodyPr>
+            <a:normAutofit/>
+          </a:bodyPr>
+          <a:lstStyle/>
+          <a:p>
+            <a:r>
+              <a:rPr lang="en-US" sz="2800" dirty="0" smtClean="0"/>
+              <a:t>cukes.info</a:t>
+            </a:r>
+          </a:p>
+          <a:p>
+            <a:r>
+              <a:rPr lang="en-US" sz="2800" dirty="0" smtClean="0"/>
+              <a:t>https://</a:t>
+            </a:r>
+            <a:r>
+              <a:rPr lang="en-US" sz="2800" dirty="0" smtClean="0"/>
+              <a:t>github.com/aslakhellesoy/cucumber/wiki</a:t>
+            </a:r>
+          </a:p>
+          <a:p>
+            <a:r>
+              <a:rPr lang="en-US" sz="2800" dirty="0" smtClean="0"/>
+              <a:t>The </a:t>
+            </a:r>
+            <a:r>
+              <a:rPr lang="en-US" sz="2800" dirty="0" err="1" smtClean="0"/>
+              <a:t>RSpec</a:t>
+            </a:r>
+            <a:r>
+              <a:rPr lang="en-US" sz="2800" dirty="0" smtClean="0"/>
+              <a:t> Book: </a:t>
+            </a:r>
+            <a:r>
+              <a:rPr lang="en-US" sz="2800" dirty="0" err="1" smtClean="0"/>
+              <a:t>Behaviour</a:t>
+            </a:r>
+            <a:r>
+              <a:rPr lang="en-US" sz="2800" dirty="0" smtClean="0"/>
+              <a:t>-Driven Development with </a:t>
+            </a:r>
+            <a:r>
+              <a:rPr lang="en-US" sz="2800" dirty="0" err="1" smtClean="0"/>
+              <a:t>RSpec</a:t>
+            </a:r>
+            <a:r>
+              <a:rPr lang="en-US" sz="2800" dirty="0" smtClean="0"/>
+              <a:t>, Cucumber, and </a:t>
+            </a:r>
+            <a:r>
+              <a:rPr lang="en-US" sz="2800" dirty="0" smtClean="0"/>
+              <a:t>Friends – Pragmatic  Bookshelf</a:t>
+            </a:r>
+            <a:endParaRPr lang="en-US" sz="2800" dirty="0" smtClean="0"/>
+          </a:p>
+          <a:p>
+            <a:r>
+              <a:rPr lang="en-US" sz="2800" dirty="0" smtClean="0"/>
+              <a:t>http</a:t>
+            </a:r>
+            <a:r>
+              <a:rPr lang="en-US" sz="2800" dirty="0" smtClean="0"/>
+              <a:t>://</a:t>
+            </a:r>
+            <a:r>
+              <a:rPr lang="en-US" sz="2800" dirty="0" smtClean="0"/>
+              <a:t>groups.google.com/group/cukes</a:t>
+            </a:r>
+          </a:p>
+          <a:p>
+            <a:r>
+              <a:rPr lang="en-US" sz="2800" dirty="0" smtClean="0"/>
+              <a:t>http://www.cheezyworld.com</a:t>
+            </a:r>
+          </a:p>
+          <a:p>
+            <a:endParaRPr lang="en-US" sz="2800" dirty="0"/>
+          </a:p>
+        </p:txBody>
+      </p:sp>
+    </p:spTree>
+  </p:cSld>
+  <p:clrMapOvr>
+    <a:masterClrMapping/>
+  </p:clrMapOvr>
+</p:sld>
+</file>
+
+<file path=ppt/slides/slide12.xml><?xml version="1.0" encoding="utf-8"?>
+<p:sld xmlns:a="http://schemas.openxmlformats.org/drawingml/2006/main" xmlns:r="http://schemas.openxmlformats.org/officeDocument/2006/relationships" xmlns:p="http://schemas.openxmlformats.org/presentationml/2006/main">
+  <p:cSld>
+    <p:spTree>
+      <p:nvGrpSpPr>
+        <p:cNvPr id="1" name=""/>
+        <p:cNvGrpSpPr/>
+        <p:nvPr/>
+      </p:nvGrpSpPr>
+      <p:grpSpPr>
+        <a:xfrm>
+          <a:off x="0" y="0"/>
+          <a:ext cx="0" cy="0"/>
+          <a:chOff x="0" y="0"/>
+          <a:chExt cx="0" cy="0"/>
+        </a:xfrm>
+      </p:grpSpPr>
+      <p:sp>
+        <p:nvSpPr>
           <p:cNvPr id="5" name="Content Placeholder 4"/>
           <p:cNvSpPr>
             <a:spLocks noGrp="1"/>
@@ -3973,11 +4334,7 @@
             </a:pPr>
             <a:r>
               <a:rPr lang="en-US" dirty="0" smtClean="0"/>
-              <a:t>Andy </a:t>
-            </a:r>
-            <a:r>
-              <a:rPr lang="en-US" dirty="0" smtClean="0"/>
-              <a:t>Vida</a:t>
+              <a:t>Andy Vida</a:t>
             </a:r>
           </a:p>
           <a:p>
@@ -4006,7 +4363,6 @@
               <a:rPr lang="en-US" sz="1600" dirty="0" smtClean="0"/>
               <a:t>614-445-2784</a:t>
             </a:r>
-            <a:endParaRPr lang="en-US" sz="1600" dirty="0" smtClean="0"/>
           </a:p>
           <a:p>
             <a:pPr>
@@ -4404,11 +4760,16 @@
             </a:pPr>
             <a:r>
               <a:rPr lang="en-US" sz="1800" dirty="0" smtClean="0"/>
-              <a:t>    Feature</a:t>
-            </a:r>
+              <a:t>    Feature: &lt;short description&gt;</a:t>
+            </a:r>
+          </a:p>
+          <a:p>
+            <a:pPr lvl="1">
+              <a:buNone/>
+            </a:pPr>
             <a:r>
               <a:rPr lang="en-US" sz="1800" dirty="0" smtClean="0"/>
-              <a:t>: &lt;short description&gt;</a:t>
+              <a:t>         &lt;story&gt;</a:t>
             </a:r>
           </a:p>
           <a:p>
@@ -4417,63 +4778,25 @@
             </a:pPr>
             <a:r>
               <a:rPr lang="en-US" sz="1800" dirty="0" smtClean="0"/>
-              <a:t>  </a:t>
-            </a:r>
+              <a:t>        &lt;scenario 1&gt;</a:t>
+            </a:r>
+          </a:p>
+          <a:p>
+            <a:pPr lvl="1">
+              <a:buNone/>
+            </a:pPr>
             <a:r>
               <a:rPr lang="en-US" sz="1800" dirty="0" smtClean="0"/>
-              <a:t>       &lt;</a:t>
-            </a:r>
+              <a:t>         ...</a:t>
+            </a:r>
+          </a:p>
+          <a:p>
+            <a:pPr lvl="1">
+              <a:buNone/>
+            </a:pPr>
             <a:r>
               <a:rPr lang="en-US" sz="1800" dirty="0" smtClean="0"/>
-              <a:t>story&gt;</a:t>
-            </a:r>
-          </a:p>
-          <a:p>
-            <a:pPr lvl="1">
-              <a:buNone/>
-            </a:pPr>
-            <a:r>
-              <a:rPr lang="en-US" sz="1800" dirty="0" smtClean="0"/>
-              <a:t> </a:t>
-            </a:r>
-            <a:r>
-              <a:rPr lang="en-US" sz="1800" dirty="0" smtClean="0"/>
-              <a:t>       </a:t>
-            </a:r>
-            <a:r>
-              <a:rPr lang="en-US" sz="1800" dirty="0" smtClean="0"/>
-              <a:t>&lt;scenario 1&gt;</a:t>
-            </a:r>
-          </a:p>
-          <a:p>
-            <a:pPr lvl="1">
-              <a:buNone/>
-            </a:pPr>
-            <a:r>
-              <a:rPr lang="en-US" sz="1800" dirty="0" smtClean="0"/>
-              <a:t>  </a:t>
-            </a:r>
-            <a:r>
-              <a:rPr lang="en-US" sz="1800" dirty="0" smtClean="0"/>
-              <a:t>       ...</a:t>
-            </a:r>
-            <a:endParaRPr lang="en-US" sz="1800" dirty="0" smtClean="0"/>
-          </a:p>
-          <a:p>
-            <a:pPr lvl="1">
-              <a:buNone/>
-            </a:pPr>
-            <a:r>
-              <a:rPr lang="en-US" sz="1800" dirty="0" smtClean="0"/>
-              <a:t> </a:t>
-            </a:r>
-            <a:r>
-              <a:rPr lang="en-US" sz="1800" dirty="0" smtClean="0"/>
-              <a:t>       </a:t>
-            </a:r>
-            <a:r>
-              <a:rPr lang="en-US" sz="1800" dirty="0" smtClean="0"/>
-              <a:t>&lt;scenario n&gt;</a:t>
+              <a:t>        &lt;scenario n&gt;</a:t>
             </a:r>
           </a:p>
           <a:p>
@@ -4599,11 +4922,7 @@
             </a:pPr>
             <a:r>
               <a:rPr lang="en-US" i="1" dirty="0" smtClean="0"/>
-              <a:t>	</a:t>
-            </a:r>
-            <a:r>
-              <a:rPr lang="en-US" i="1" dirty="0" smtClean="0"/>
-              <a:t>So that &lt;business value&gt;</a:t>
+              <a:t>	So that &lt;business value&gt;</a:t>
             </a:r>
             <a:endParaRPr lang="en-US" i="1" dirty="0"/>
           </a:p>
@@ -4723,11 +5042,16 @@
             </a:pPr>
             <a:r>
               <a:rPr lang="en-US" i="1" dirty="0" smtClean="0"/>
-              <a:t>	</a:t>
-            </a:r>
+              <a:t>		&lt;step 1&gt;</a:t>
+            </a:r>
+          </a:p>
+          <a:p>
+            <a:pPr>
+              <a:buNone/>
+            </a:pPr>
             <a:r>
               <a:rPr lang="en-US" i="1" dirty="0" smtClean="0"/>
-              <a:t>	&lt;step 1&gt;</a:t>
+              <a:t>		…</a:t>
             </a:r>
           </a:p>
           <a:p>
@@ -4736,24 +5060,7 @@
             </a:pPr>
             <a:r>
               <a:rPr lang="en-US" i="1" dirty="0" smtClean="0"/>
-              <a:t>	</a:t>
-            </a:r>
-            <a:r>
-              <a:rPr lang="en-US" i="1" dirty="0" smtClean="0"/>
-              <a:t>	…</a:t>
-            </a:r>
-          </a:p>
-          <a:p>
-            <a:pPr>
-              <a:buNone/>
-            </a:pPr>
-            <a:r>
-              <a:rPr lang="en-US" i="1" dirty="0" smtClean="0"/>
-              <a:t>	</a:t>
-            </a:r>
-            <a:r>
-              <a:rPr lang="en-US" i="1" dirty="0" smtClean="0"/>
-              <a:t>	&lt;step 2&gt;</a:t>
+              <a:t>		&lt;step 2&gt;</a:t>
             </a:r>
           </a:p>
           <a:p>
@@ -4937,188 +5244,162 @@
       </p:grpSpPr>
       <p:sp>
         <p:nvSpPr>
-          <p:cNvPr id="3074" name="Rectangle 2"/>
-          <p:cNvSpPr>
-            <a:spLocks noGrp="1" noChangeArrowheads="1"/>
-          </p:cNvSpPr>
-          <p:nvPr>
-            <p:ph type="title"/>
-          </p:nvPr>
-        </p:nvSpPr>
-        <p:spPr/>
-        <p:txBody>
-          <a:bodyPr/>
-          <a:lstStyle/>
-          <a:p>
-            <a:r>
-              <a:rPr lang="en-US" dirty="0"/>
-              <a:t>Scoring Bowling.</a:t>
-            </a:r>
-          </a:p>
-        </p:txBody>
-      </p:sp>
-      <p:graphicFrame>
-        <p:nvGraphicFramePr>
-          <p:cNvPr id="3084" name="Object 12"/>
-          <p:cNvGraphicFramePr>
-            <a:graphicFrameLocks noGrp="1" noChangeAspect="1"/>
-          </p:cNvGraphicFramePr>
-          <p:nvPr>
-            <p:ph idx="1"/>
-          </p:nvPr>
-        </p:nvGraphicFramePr>
-        <p:xfrm>
-          <a:off x="2209800" y="1295400"/>
-          <a:ext cx="4724400" cy="465138"/>
-        </p:xfrm>
-        <a:graphic>
-          <a:graphicData uri="http://schemas.openxmlformats.org/presentationml/2006/ole">
-            <p:oleObj spid="_x0000_s1029" name="VISIO" r:id="rId4" imgW="2066400" imgH="203760" progId="Visio.Drawing.11">
-              <p:embed/>
-            </p:oleObj>
-          </a:graphicData>
-        </a:graphic>
-      </p:graphicFrame>
-      <p:sp>
-        <p:nvSpPr>
-          <p:cNvPr id="3086" name="Text Box 14"/>
-          <p:cNvSpPr txBox="1">
-            <a:spLocks noChangeArrowheads="1"/>
-          </p:cNvSpPr>
+          <p:cNvPr id="5" name="Rectangle 4"/>
+          <p:cNvSpPr/>
           <p:nvPr/>
         </p:nvSpPr>
-        <p:spPr bwMode="auto">
+        <p:spPr>
           <a:xfrm>
-            <a:off x="441325" y="2017713"/>
-            <a:ext cx="8235950" cy="4211637"/>
+            <a:off x="381000" y="457200"/>
+            <a:ext cx="8458200" cy="5632311"/>
           </a:xfrm>
           <a:prstGeom prst="rect">
             <a:avLst/>
           </a:prstGeom>
-          <a:noFill/>
-          <a:ln w="9525">
-            <a:noFill/>
-            <a:miter lim="800000"/>
-            <a:headEnd/>
-            <a:tailEnd/>
-          </a:ln>
-          <a:effectLst/>
         </p:spPr>
         <p:txBody>
-          <a:bodyPr wrap="none">
+          <a:bodyPr wrap="square">
             <a:spAutoFit/>
           </a:bodyPr>
           <a:lstStyle/>
           <a:p>
             <a:r>
-              <a:rPr lang="en-US" dirty="0">
-                <a:latin typeface="Arial" charset="0"/>
-              </a:rPr>
-              <a:t>The game consists of 10 frames as shown above.  In each frame the player has</a:t>
-            </a:r>
-          </a:p>
-          <a:p>
-            <a:r>
-              <a:rPr lang="en-US" dirty="0">
-                <a:latin typeface="Arial" charset="0"/>
-              </a:rPr>
-              <a:t>two opportunities to knock down 10 pins.  The score for the frame is the total</a:t>
-            </a:r>
-          </a:p>
-          <a:p>
-            <a:r>
-              <a:rPr lang="en-US" dirty="0">
-                <a:latin typeface="Arial" charset="0"/>
-              </a:rPr>
-              <a:t>number of pins knocked down, plus bonuses for strikes and spares.</a:t>
-            </a:r>
-          </a:p>
-          <a:p>
-            <a:endParaRPr lang="en-US" dirty="0">
-              <a:latin typeface="Arial" charset="0"/>
-            </a:endParaRPr>
-          </a:p>
-          <a:p>
-            <a:r>
-              <a:rPr lang="en-US" dirty="0">
-                <a:latin typeface="Arial" charset="0"/>
-              </a:rPr>
-              <a:t>A spare is when the player knocks down all 10 pins in two tries.  The bonus for</a:t>
-            </a:r>
-          </a:p>
-          <a:p>
-            <a:r>
-              <a:rPr lang="en-US" dirty="0">
-                <a:latin typeface="Arial" charset="0"/>
-              </a:rPr>
-              <a:t>that frame is the number of pins knocked down by the next roll.  So in frame 3</a:t>
-            </a:r>
-          </a:p>
-          <a:p>
-            <a:r>
-              <a:rPr lang="en-US" dirty="0">
-                <a:latin typeface="Arial" charset="0"/>
-              </a:rPr>
-              <a:t>above, the score is 10 (the total number knocked down) plus a bonus of 5 (the</a:t>
-            </a:r>
-          </a:p>
-          <a:p>
-            <a:r>
-              <a:rPr lang="en-US" dirty="0">
-                <a:latin typeface="Arial" charset="0"/>
-              </a:rPr>
-              <a:t>number of pins knocked down on the next roll.)</a:t>
-            </a:r>
-          </a:p>
-          <a:p>
-            <a:endParaRPr lang="en-US" dirty="0">
-              <a:latin typeface="Arial" charset="0"/>
-            </a:endParaRPr>
-          </a:p>
-          <a:p>
-            <a:r>
-              <a:rPr lang="en-US" dirty="0">
-                <a:latin typeface="Arial" charset="0"/>
-              </a:rPr>
-              <a:t>A strike is when the player knocks down all 10 pins on his first try.  The bonus</a:t>
-            </a:r>
-          </a:p>
-          <a:p>
-            <a:r>
-              <a:rPr lang="en-US" dirty="0">
-                <a:latin typeface="Arial" charset="0"/>
-              </a:rPr>
-              <a:t>for that frame is the value of the next two balls rolled.</a:t>
-            </a:r>
-          </a:p>
-          <a:p>
-            <a:endParaRPr lang="en-US" dirty="0">
-              <a:latin typeface="Arial" charset="0"/>
-            </a:endParaRPr>
-          </a:p>
-          <a:p>
-            <a:r>
-              <a:rPr lang="en-US" dirty="0">
-                <a:latin typeface="Arial" charset="0"/>
-              </a:rPr>
-              <a:t>In the tenth frame a player who rolls a spare or strike is allowed to roll the extra</a:t>
-            </a:r>
-          </a:p>
-          <a:p>
-            <a:r>
-              <a:rPr lang="en-US" dirty="0">
-                <a:latin typeface="Arial" charset="0"/>
-              </a:rPr>
-              <a:t>balls to complete the frame.  However no more than three balls can be rolled in</a:t>
-            </a:r>
-          </a:p>
-          <a:p>
-            <a:r>
-              <a:rPr lang="en-US" dirty="0">
-                <a:latin typeface="Arial" charset="0"/>
-              </a:rPr>
-              <a:t>tenth frame.</a:t>
-            </a:r>
+              <a:rPr lang="en-US" sz="2000" dirty="0" smtClean="0"/>
+              <a:t>Feature: Adding CA vehicles</a:t>
+            </a:r>
+          </a:p>
+          <a:p>
+            <a:r>
+              <a:rPr lang="en-US" sz="2000" dirty="0" smtClean="0"/>
+              <a:t>   As a GAINWeb user</a:t>
+            </a:r>
+          </a:p>
+          <a:p>
+            <a:r>
+              <a:rPr lang="en-US" sz="2000" dirty="0" smtClean="0"/>
+              <a:t> </a:t>
+            </a:r>
+            <a:r>
+              <a:rPr lang="en-US" sz="2000" dirty="0" smtClean="0"/>
+              <a:t>  I want to cancel out of adding a vehicle</a:t>
+            </a:r>
+          </a:p>
+          <a:p>
+            <a:r>
+              <a:rPr lang="en-US" sz="2000" dirty="0" smtClean="0"/>
+              <a:t> </a:t>
+            </a:r>
+            <a:r>
+              <a:rPr lang="en-US" sz="2000" dirty="0" smtClean="0"/>
+              <a:t>  So that only the number of vehicles I want get added</a:t>
+            </a:r>
+            <a:endParaRPr lang="en-US" sz="2000" dirty="0" smtClean="0"/>
+          </a:p>
+          <a:p>
+            <a:r>
+              <a:rPr lang="en-US" sz="2000" dirty="0" smtClean="0"/>
+              <a:t>Background</a:t>
+            </a:r>
+            <a:r>
+              <a:rPr lang="en-US" sz="2000" dirty="0" smtClean="0"/>
+              <a:t>:</a:t>
+            </a:r>
+          </a:p>
+          <a:p>
+            <a:r>
+              <a:rPr lang="en-US" sz="2000" dirty="0" smtClean="0"/>
+              <a:t>    Given that I am adding a "CA" quote for "IA"</a:t>
+            </a:r>
+          </a:p>
+          <a:p>
+            <a:r>
+              <a:rPr lang="en-US" sz="2000" dirty="0" smtClean="0"/>
+              <a:t>    And </a:t>
+            </a:r>
+            <a:r>
+              <a:rPr lang="en-US" sz="2000" dirty="0" smtClean="0"/>
+              <a:t>I enter all the data up to Adding A Vehicle</a:t>
+            </a:r>
+            <a:endParaRPr lang="en-US" sz="2000" dirty="0" smtClean="0"/>
+          </a:p>
+          <a:p>
+            <a:r>
+              <a:rPr lang="en-US" sz="2000" dirty="0" smtClean="0"/>
+              <a:t>Scenario: Cancelling out of Adding a Vehicle</a:t>
+            </a:r>
+          </a:p>
+          <a:p>
+            <a:r>
+              <a:rPr lang="en-US" sz="2000" dirty="0" smtClean="0"/>
+              <a:t>    When I enter "WMWMF33539TU74123" as the VIN</a:t>
+            </a:r>
+          </a:p>
+          <a:p>
+            <a:r>
+              <a:rPr lang="en-US" sz="2000" dirty="0" smtClean="0"/>
+              <a:t>    And I select "MINI COOPERS" as the Make</a:t>
+            </a:r>
+          </a:p>
+          <a:p>
+            <a:r>
+              <a:rPr lang="en-US" sz="2000" dirty="0" smtClean="0"/>
+              <a:t>    And I select "Private Passenger" as the vehicle type</a:t>
+            </a:r>
+          </a:p>
+          <a:p>
+            <a:r>
+              <a:rPr lang="en-US" sz="2000" dirty="0" smtClean="0"/>
+              <a:t>    And I select "Business Purposes" as the vehicle use</a:t>
+            </a:r>
+          </a:p>
+          <a:p>
+            <a:r>
+              <a:rPr lang="en-US" sz="2000" dirty="0" smtClean="0"/>
+              <a:t>    And I select "No" for the Additional Insured</a:t>
+            </a:r>
+          </a:p>
+          <a:p>
+            <a:r>
+              <a:rPr lang="en-US" sz="2000" dirty="0" smtClean="0"/>
+              <a:t>    And I press "Add Vehicle"</a:t>
+            </a:r>
+          </a:p>
+          <a:p>
+            <a:r>
+              <a:rPr lang="en-US" sz="2000" dirty="0" smtClean="0"/>
+              <a:t>    And I press "Return to Main Menu"</a:t>
+            </a:r>
+          </a:p>
+          <a:p>
+            <a:r>
+              <a:rPr lang="en-US" sz="2000" dirty="0" smtClean="0"/>
+              <a:t>    And I re-open the policy</a:t>
+            </a:r>
+          </a:p>
+          <a:p>
+            <a:r>
+              <a:rPr lang="en-US" sz="2000" dirty="0" smtClean="0"/>
+              <a:t>    And I navigate to the "Vehicles" page</a:t>
+            </a:r>
+          </a:p>
+          <a:p>
+            <a:r>
+              <a:rPr lang="en-US" sz="2000" dirty="0" smtClean="0"/>
+              <a:t>    Then I </a:t>
+            </a:r>
+            <a:r>
+              <a:rPr lang="en-US" sz="2000" dirty="0" smtClean="0"/>
+              <a:t>should not get the  </a:t>
+            </a:r>
+            <a:r>
+              <a:rPr lang="en-US" sz="2000" dirty="0" smtClean="0"/>
+              <a:t>error "Vehicle Garaging Location not </a:t>
+            </a:r>
+            <a:r>
+              <a:rPr lang="en-US" sz="2000" dirty="0" smtClean="0"/>
+              <a:t>specified"</a:t>
+            </a:r>
+            <a:endParaRPr lang="en-US" sz="2000" dirty="0"/>
           </a:p>
         </p:txBody>
       </p:sp>
@@ -5127,13 +5408,6 @@
   <p:clrMapOvr>
     <a:masterClrMapping/>
   </p:clrMapOvr>
-  <p:timing>
-    <p:tnLst>
-      <p:par>
-        <p:cTn id="1" dur="indefinite" restart="never" nodeType="tmRoot"/>
-      </p:par>
-    </p:tnLst>
-  </p:timing>
 </p:sld>
 </file>
 

</xml_diff>

<commit_message>
updated about bdd slides and testing comparison slides
</commit_message>
<xml_diff>
--- a/Presentations/BDD Lunch & Learn.pptx
+++ b/Presentations/BDD Lunch & Learn.pptx
@@ -9,8 +9,8 @@
   </p:notesMasterIdLst>
   <p:sldIdLst>
     <p:sldId id="256" r:id="rId2"/>
-    <p:sldId id="257" r:id="rId3"/>
-    <p:sldId id="258" r:id="rId4"/>
+    <p:sldId id="269" r:id="rId3"/>
+    <p:sldId id="270" r:id="rId4"/>
     <p:sldId id="262" r:id="rId5"/>
     <p:sldId id="263" r:id="rId6"/>
     <p:sldId id="264" r:id="rId7"/>
@@ -375,7 +375,7 @@
     </p:spTree>
     <p:extLst>
       <p:ext uri="{BB962C8B-B14F-4D97-AF65-F5344CB8AC3E}">
-        <p14:creationId xmlns="" xmlns:p14="http://schemas.microsoft.com/office/powerpoint/2010/main" val="3371909597"/>
+        <p14:creationId xmlns:p14="http://schemas.microsoft.com/office/powerpoint/2010/main" xmlns="" val="3371909597"/>
       </p:ext>
     </p:extLst>
   </p:cSld>
@@ -521,36 +521,49 @@
           </a:bodyPr>
           <a:lstStyle/>
           <a:p>
-            <a:pPr marL="0" marR="0" lvl="0" indent="0" algn="l" defTabSz="914400" rtl="0" eaLnBrk="1" fontAlgn="auto" latinLnBrk="0" hangingPunct="1">
-              <a:lnSpc>
-                <a:spcPct val="100000"/>
-              </a:lnSpc>
-              <a:spcBef>
-                <a:spcPts val="0"/>
-              </a:spcBef>
-              <a:spcAft>
-                <a:spcPts val="0"/>
-              </a:spcAft>
-              <a:buClrTx/>
-              <a:buSzTx/>
+            <a:pPr>
               <a:buFontTx/>
-              <a:buNone/>
-              <a:tabLst/>
-              <a:defRPr/>
+              <a:buChar char="-"/>
             </a:pPr>
             <a:r>
-              <a:rPr lang="en-US" sz="1200" kern="1200" dirty="0" smtClean="0">
-                <a:solidFill>
-                  <a:schemeClr val="tx1"/>
-                </a:solidFill>
-                <a:latin typeface="+mn-lt"/>
-                <a:ea typeface="+mn-ea"/>
-                <a:cs typeface="+mn-cs"/>
-              </a:rPr>
-              <a:t>Within the definition of a feature you can provide a plain text description of the story, focusing on three important questions:</a:t>
-            </a:r>
-          </a:p>
-          <a:p>
+              <a:rPr lang="en-US" baseline="0" dirty="0" smtClean="0"/>
+              <a:t>Tests from the perspective of the user</a:t>
+            </a:r>
+          </a:p>
+          <a:p>
+            <a:pPr>
+              <a:buFontTx/>
+              <a:buChar char="-"/>
+            </a:pPr>
+            <a:r>
+              <a:rPr lang="en-US" baseline="0" dirty="0" smtClean="0"/>
+              <a:t> Tests behavior of the system</a:t>
+            </a:r>
+          </a:p>
+          <a:p>
+            <a:pPr>
+              <a:buFontTx/>
+              <a:buChar char="-"/>
+            </a:pPr>
+            <a:r>
+              <a:rPr lang="en-US" baseline="0" dirty="0" smtClean="0"/>
+              <a:t> Executable requirements, </a:t>
+            </a:r>
+            <a:r>
+              <a:rPr lang="en-US" baseline="0" dirty="0" err="1" smtClean="0"/>
+              <a:t>codefied</a:t>
+            </a:r>
+            <a:endParaRPr lang="en-US" baseline="0" dirty="0" smtClean="0"/>
+          </a:p>
+          <a:p>
+            <a:pPr lvl="1">
+              <a:buFontTx/>
+              <a:buChar char="-"/>
+            </a:pPr>
+            <a:r>
+              <a:rPr lang="en-US" baseline="0" dirty="0" smtClean="0"/>
+              <a:t> not disposable artifacts</a:t>
+            </a:r>
             <a:endParaRPr lang="en-US" dirty="0"/>
           </a:p>
         </p:txBody>
@@ -573,7 +586,7 @@
             <a:fld id="{B11DEF3E-FE12-4F21-AE79-15D58AC530AF}" type="slidenum">
               <a:rPr lang="en-US" smtClean="0"/>
               <a:pPr/>
-              <a:t>6</a:t>
+              <a:t>2</a:t>
             </a:fld>
             <a:endParaRPr lang="en-US"/>
           </a:p>
@@ -633,6 +646,207 @@
           </a:bodyPr>
           <a:lstStyle/>
           <a:p>
+            <a:pPr>
+              <a:buFontTx/>
+              <a:buChar char="-"/>
+            </a:pPr>
+            <a:r>
+              <a:rPr lang="en-US" dirty="0" smtClean="0"/>
+              <a:t>TDD is a development practice</a:t>
+            </a:r>
+          </a:p>
+        </p:txBody>
+      </p:sp>
+      <p:sp>
+        <p:nvSpPr>
+          <p:cNvPr id="4" name="Slide Number Placeholder 3"/>
+          <p:cNvSpPr>
+            <a:spLocks noGrp="1"/>
+          </p:cNvSpPr>
+          <p:nvPr>
+            <p:ph type="sldNum" sz="quarter" idx="10"/>
+          </p:nvPr>
+        </p:nvSpPr>
+        <p:spPr/>
+        <p:txBody>
+          <a:bodyPr/>
+          <a:lstStyle/>
+          <a:p>
+            <a:fld id="{B11DEF3E-FE12-4F21-AE79-15D58AC530AF}" type="slidenum">
+              <a:rPr lang="en-US" smtClean="0"/>
+              <a:pPr/>
+              <a:t>3</a:t>
+            </a:fld>
+            <a:endParaRPr lang="en-US"/>
+          </a:p>
+        </p:txBody>
+      </p:sp>
+    </p:spTree>
+  </p:cSld>
+  <p:clrMapOvr>
+    <a:masterClrMapping/>
+  </p:clrMapOvr>
+</p:notes>
+</file>
+
+<file path=ppt/notesSlides/notesSlide3.xml><?xml version="1.0" encoding="utf-8"?>
+<p:notes xmlns:a="http://schemas.openxmlformats.org/drawingml/2006/main" xmlns:r="http://schemas.openxmlformats.org/officeDocument/2006/relationships" xmlns:p="http://schemas.openxmlformats.org/presentationml/2006/main">
+  <p:cSld>
+    <p:spTree>
+      <p:nvGrpSpPr>
+        <p:cNvPr id="1" name=""/>
+        <p:cNvGrpSpPr/>
+        <p:nvPr/>
+      </p:nvGrpSpPr>
+      <p:grpSpPr>
+        <a:xfrm>
+          <a:off x="0" y="0"/>
+          <a:ext cx="0" cy="0"/>
+          <a:chOff x="0" y="0"/>
+          <a:chExt cx="0" cy="0"/>
+        </a:xfrm>
+      </p:grpSpPr>
+      <p:sp>
+        <p:nvSpPr>
+          <p:cNvPr id="2" name="Slide Image Placeholder 1"/>
+          <p:cNvSpPr>
+            <a:spLocks noGrp="1" noRot="1" noChangeAspect="1"/>
+          </p:cNvSpPr>
+          <p:nvPr>
+            <p:ph type="sldImg"/>
+          </p:nvPr>
+        </p:nvSpPr>
+        <p:spPr/>
+      </p:sp>
+      <p:sp>
+        <p:nvSpPr>
+          <p:cNvPr id="3" name="Notes Placeholder 2"/>
+          <p:cNvSpPr>
+            <a:spLocks noGrp="1"/>
+          </p:cNvSpPr>
+          <p:nvPr>
+            <p:ph type="body" idx="1"/>
+          </p:nvPr>
+        </p:nvSpPr>
+        <p:spPr/>
+        <p:txBody>
+          <a:bodyPr>
+            <a:normAutofit/>
+          </a:bodyPr>
+          <a:lstStyle/>
+          <a:p>
+            <a:pPr marL="0" marR="0" lvl="0" indent="0" algn="l" defTabSz="914400" rtl="0" eaLnBrk="1" fontAlgn="auto" latinLnBrk="0" hangingPunct="1">
+              <a:lnSpc>
+                <a:spcPct val="100000"/>
+              </a:lnSpc>
+              <a:spcBef>
+                <a:spcPts val="0"/>
+              </a:spcBef>
+              <a:spcAft>
+                <a:spcPts val="0"/>
+              </a:spcAft>
+              <a:buClrTx/>
+              <a:buSzTx/>
+              <a:buFontTx/>
+              <a:buNone/>
+              <a:tabLst/>
+              <a:defRPr/>
+            </a:pPr>
+            <a:r>
+              <a:rPr lang="en-US" sz="1200" kern="1200" dirty="0" smtClean="0">
+                <a:solidFill>
+                  <a:schemeClr val="tx1"/>
+                </a:solidFill>
+                <a:latin typeface="+mn-lt"/>
+                <a:ea typeface="+mn-ea"/>
+                <a:cs typeface="+mn-cs"/>
+              </a:rPr>
+              <a:t>Within the definition of a feature you can provide a plain text description of the story, focusing on three important questions:</a:t>
+            </a:r>
+          </a:p>
+          <a:p>
+            <a:endParaRPr lang="en-US" dirty="0"/>
+          </a:p>
+        </p:txBody>
+      </p:sp>
+      <p:sp>
+        <p:nvSpPr>
+          <p:cNvPr id="4" name="Slide Number Placeholder 3"/>
+          <p:cNvSpPr>
+            <a:spLocks noGrp="1"/>
+          </p:cNvSpPr>
+          <p:nvPr>
+            <p:ph type="sldNum" sz="quarter" idx="10"/>
+          </p:nvPr>
+        </p:nvSpPr>
+        <p:spPr/>
+        <p:txBody>
+          <a:bodyPr/>
+          <a:lstStyle/>
+          <a:p>
+            <a:fld id="{B11DEF3E-FE12-4F21-AE79-15D58AC530AF}" type="slidenum">
+              <a:rPr lang="en-US" smtClean="0"/>
+              <a:pPr/>
+              <a:t>6</a:t>
+            </a:fld>
+            <a:endParaRPr lang="en-US"/>
+          </a:p>
+        </p:txBody>
+      </p:sp>
+    </p:spTree>
+  </p:cSld>
+  <p:clrMapOvr>
+    <a:masterClrMapping/>
+  </p:clrMapOvr>
+</p:notes>
+</file>
+
+<file path=ppt/notesSlides/notesSlide4.xml><?xml version="1.0" encoding="utf-8"?>
+<p:notes xmlns:a="http://schemas.openxmlformats.org/drawingml/2006/main" xmlns:r="http://schemas.openxmlformats.org/officeDocument/2006/relationships" xmlns:p="http://schemas.openxmlformats.org/presentationml/2006/main">
+  <p:cSld>
+    <p:spTree>
+      <p:nvGrpSpPr>
+        <p:cNvPr id="1" name=""/>
+        <p:cNvGrpSpPr/>
+        <p:nvPr/>
+      </p:nvGrpSpPr>
+      <p:grpSpPr>
+        <a:xfrm>
+          <a:off x="0" y="0"/>
+          <a:ext cx="0" cy="0"/>
+          <a:chOff x="0" y="0"/>
+          <a:chExt cx="0" cy="0"/>
+        </a:xfrm>
+      </p:grpSpPr>
+      <p:sp>
+        <p:nvSpPr>
+          <p:cNvPr id="2" name="Slide Image Placeholder 1"/>
+          <p:cNvSpPr>
+            <a:spLocks noGrp="1" noRot="1" noChangeAspect="1"/>
+          </p:cNvSpPr>
+          <p:nvPr>
+            <p:ph type="sldImg"/>
+          </p:nvPr>
+        </p:nvSpPr>
+        <p:spPr/>
+      </p:sp>
+      <p:sp>
+        <p:nvSpPr>
+          <p:cNvPr id="3" name="Notes Placeholder 2"/>
+          <p:cNvSpPr>
+            <a:spLocks noGrp="1"/>
+          </p:cNvSpPr>
+          <p:nvPr>
+            <p:ph type="body" idx="1"/>
+          </p:nvPr>
+        </p:nvSpPr>
+        <p:spPr/>
+        <p:txBody>
+          <a:bodyPr>
+            <a:normAutofit/>
+          </a:bodyPr>
+          <a:lstStyle/>
+          <a:p>
             <a:pPr lvl="2"/>
             <a:r>
               <a:rPr lang="en-US" sz="1200" i="1" kern="1200" dirty="0" smtClean="0">
@@ -782,7 +996,7 @@
 </p:notes>
 </file>
 
-<file path=ppt/notesSlides/notesSlide3.xml><?xml version="1.0" encoding="utf-8"?>
+<file path=ppt/notesSlides/notesSlide5.xml><?xml version="1.0" encoding="utf-8"?>
 <p:notes xmlns:a="http://schemas.openxmlformats.org/drawingml/2006/main" xmlns:r="http://schemas.openxmlformats.org/officeDocument/2006/relationships" xmlns:p="http://schemas.openxmlformats.org/presentationml/2006/main">
   <p:cSld>
     <p:spTree>
@@ -4158,46 +4372,10 @@
           </a:p>
           <a:p>
             <a:r>
-              <a:rPr lang="en-US" sz="2800" dirty="0" smtClean="0"/>
-              <a:t>https://</a:t>
-            </a:r>
-            <a:r>
-              <a:rPr lang="en-US" sz="2800" dirty="0" smtClean="0"/>
-              <a:t>github.com/aslakhellesoy/cucumber/wiki</a:t>
-            </a:r>
-          </a:p>
-          <a:p>
-            <a:r>
-              <a:rPr lang="en-US" sz="2800" dirty="0" smtClean="0"/>
-              <a:t>The </a:t>
-            </a:r>
-            <a:r>
-              <a:rPr lang="en-US" sz="2800" dirty="0" err="1" smtClean="0"/>
-              <a:t>RSpec</a:t>
-            </a:r>
-            <a:r>
-              <a:rPr lang="en-US" sz="2800" dirty="0" smtClean="0"/>
-              <a:t> Book: </a:t>
-            </a:r>
-            <a:r>
-              <a:rPr lang="en-US" sz="2800" dirty="0" err="1" smtClean="0"/>
-              <a:t>Behaviour</a:t>
-            </a:r>
-            <a:r>
-              <a:rPr lang="en-US" sz="2800" dirty="0" smtClean="0"/>
-              <a:t>-Driven Development with </a:t>
-            </a:r>
-            <a:r>
-              <a:rPr lang="en-US" sz="2800" dirty="0" err="1" smtClean="0"/>
-              <a:t>RSpec</a:t>
-            </a:r>
-            <a:r>
-              <a:rPr lang="en-US" sz="2800" dirty="0" smtClean="0"/>
-              <a:t>, Cucumber, and </a:t>
-            </a:r>
-            <a:r>
-              <a:rPr lang="en-US" sz="2800" dirty="0" smtClean="0"/>
-              <a:t>Friends – Pragmatic  Bookshelf</a:t>
+              <a:rPr lang="en-US" sz="2800" dirty="0" smtClean="0">
+                <a:hlinkClick r:id="rId2"/>
+              </a:rPr>
+              <a:t>https://github.com/aslakhellesoy/cucumber/wiki</a:t>
             </a:r>
             <a:endParaRPr lang="en-US" sz="2800" dirty="0" smtClean="0"/>
           </a:p>
@@ -4208,18 +4386,78 @@
             </a:r>
             <a:r>
               <a:rPr lang="en-US" sz="2800" dirty="0" smtClean="0"/>
-              <a:t>://</a:t>
-            </a:r>
+              <a:t>://groups.google.com/group/cukes</a:t>
+            </a:r>
+          </a:p>
+          <a:p>
+            <a:r>
+              <a:rPr lang="en-US" sz="2800" dirty="0" smtClean="0">
+                <a:hlinkClick r:id="rId3"/>
+              </a:rPr>
+              <a:t>http://</a:t>
+            </a:r>
+            <a:r>
+              <a:rPr lang="en-US" sz="2800" dirty="0" smtClean="0">
+                <a:hlinkClick r:id="rId3"/>
+              </a:rPr>
+              <a:t>www.cheezyworld.com</a:t>
+            </a:r>
+            <a:endParaRPr lang="en-US" sz="2800" dirty="0" smtClean="0"/>
+          </a:p>
+          <a:p>
             <a:r>
               <a:rPr lang="en-US" sz="2800" dirty="0" smtClean="0"/>
-              <a:t>groups.google.com/group/cukes</a:t>
-            </a:r>
-          </a:p>
-          <a:p>
+              <a:t>Samples and Presentation:  </a:t>
+            </a:r>
+            <a:r>
+              <a:rPr lang="en-US" sz="2800" dirty="0" err="1" smtClean="0">
+                <a:hlinkClick r:id="rId4"/>
+              </a:rPr>
+              <a:t>git@github.com:shawnewallace</a:t>
+            </a:r>
+            <a:r>
+              <a:rPr lang="en-US" sz="2800" dirty="0" smtClean="0">
+                <a:hlinkClick r:id="rId4"/>
+              </a:rPr>
+              <a:t>/Katas.git</a:t>
+            </a:r>
+            <a:endParaRPr lang="en-US" sz="2800" dirty="0" smtClean="0"/>
+          </a:p>
+          <a:p>
+            <a:r>
+              <a:rPr lang="en-US" sz="2800" u="sng" dirty="0" smtClean="0"/>
+              <a:t>The </a:t>
+            </a:r>
+            <a:r>
+              <a:rPr lang="en-US" sz="2800" u="sng" dirty="0" err="1" smtClean="0"/>
+              <a:t>Rspec</a:t>
+            </a:r>
+            <a:r>
+              <a:rPr lang="en-US" sz="2800" u="sng" dirty="0" smtClean="0"/>
+              <a:t> Book</a:t>
+            </a:r>
             <a:r>
               <a:rPr lang="en-US" sz="2800" dirty="0" smtClean="0"/>
-              <a:t>http://www.cheezyworld.com</a:t>
-            </a:r>
+              <a:t>, David </a:t>
+            </a:r>
+            <a:r>
+              <a:rPr lang="en-US" sz="2800" dirty="0" err="1" smtClean="0"/>
+              <a:t>Chelimsky</a:t>
+            </a:r>
+            <a:r>
+              <a:rPr lang="en-US" sz="2800" dirty="0" smtClean="0"/>
+              <a:t>:  </a:t>
+            </a:r>
+            <a:r>
+              <a:rPr lang="en-US" sz="2800" dirty="0" smtClean="0">
+                <a:hlinkClick r:id="rId5"/>
+              </a:rPr>
+              <a:t>http://www.pragprog.com/titles/achbd/the-rspec-book</a:t>
+            </a:r>
+            <a:endParaRPr lang="en-US" sz="2800" dirty="0" smtClean="0"/>
+          </a:p>
+          <a:p>
+            <a:endParaRPr lang="en-US" sz="2800" dirty="0" smtClean="0"/>
           </a:p>
           <a:p>
             <a:endParaRPr lang="en-US" sz="2800" dirty="0"/>
@@ -4231,6 +4469,13 @@
   <p:clrMapOvr>
     <a:masterClrMapping/>
   </p:clrMapOvr>
+  <p:timing>
+    <p:tnLst>
+      <p:par>
+        <p:cTn id="1" dur="indefinite" restart="never" nodeType="tmRoot"/>
+      </p:par>
+    </p:tnLst>
+  </p:timing>
 </p:sld>
 </file>
 
@@ -4404,6 +4649,38 @@
           <a:chExt cx="0" cy="0"/>
         </a:xfrm>
       </p:grpSpPr>
+      <p:pic>
+        <p:nvPicPr>
+          <p:cNvPr id="10241" name="Picture 1" descr="image001"/>
+          <p:cNvPicPr>
+            <a:picLocks noChangeAspect="1" noChangeArrowheads="1"/>
+          </p:cNvPicPr>
+          <p:nvPr/>
+        </p:nvPicPr>
+        <p:blipFill>
+          <a:blip r:embed="rId3" cstate="print"/>
+          <a:srcRect/>
+          <a:stretch>
+            <a:fillRect/>
+          </a:stretch>
+        </p:blipFill>
+        <p:spPr bwMode="auto">
+          <a:xfrm>
+            <a:off x="5924550" y="3581400"/>
+            <a:ext cx="3219450" cy="3276600"/>
+          </a:xfrm>
+          <a:prstGeom prst="rect">
+            <a:avLst/>
+          </a:prstGeom>
+          <a:noFill/>
+          <a:ln w="9525">
+            <a:noFill/>
+            <a:miter lim="800000"/>
+            <a:headEnd/>
+            <a:tailEnd/>
+          </a:ln>
+        </p:spPr>
+      </p:pic>
       <p:sp>
         <p:nvSpPr>
           <p:cNvPr id="2" name="Title 1"/>
@@ -4441,6 +4718,30 @@
         <p:txBody>
           <a:bodyPr/>
           <a:lstStyle/>
+          <a:p>
+            <a:r>
+              <a:rPr lang="en-US" dirty="0" smtClean="0"/>
+              <a:t>Automated evaluation from the perspective of the user</a:t>
+            </a:r>
+          </a:p>
+          <a:p>
+            <a:r>
+              <a:rPr lang="en-US" dirty="0" smtClean="0"/>
+              <a:t>Tests behavior of the system</a:t>
+            </a:r>
+          </a:p>
+          <a:p>
+            <a:r>
+              <a:rPr lang="en-US" dirty="0" smtClean="0"/>
+              <a:t>Executable requirements</a:t>
+            </a:r>
+          </a:p>
+          <a:p>
+            <a:r>
+              <a:rPr lang="en-US" dirty="0" smtClean="0"/>
+              <a:t>But, it is not enough</a:t>
+            </a:r>
+          </a:p>
           <a:p>
             <a:endParaRPr lang="en-US" dirty="0"/>
           </a:p>
@@ -4488,14 +4789,21 @@
             <p:ph type="title"/>
           </p:nvPr>
         </p:nvSpPr>
-        <p:spPr/>
-        <p:txBody>
-          <a:bodyPr/>
+        <p:spPr>
+          <a:xfrm>
+            <a:off x="0" y="274638"/>
+            <a:ext cx="9144000" cy="1143000"/>
+          </a:xfrm>
+        </p:spPr>
+        <p:txBody>
+          <a:bodyPr>
+            <a:normAutofit fontScale="90000"/>
+          </a:bodyPr>
           <a:lstStyle/>
           <a:p>
             <a:r>
               <a:rPr lang="en-US" dirty="0" smtClean="0"/>
-              <a:t>Acceptance Tests vs. Unit Tests</a:t>
+              <a:t>Acceptance Tests vs. Unit and Integration Tests</a:t>
             </a:r>
             <a:endParaRPr lang="en-US" dirty="0"/>
           </a:p>
@@ -4512,7 +4820,7 @@
           </p:nvPr>
         </p:nvPicPr>
         <p:blipFill>
-          <a:blip r:embed="rId2" cstate="print"/>
+          <a:blip r:embed="rId3" cstate="print"/>
           <a:srcRect/>
           <a:stretch>
             <a:fillRect/>
@@ -4520,8 +4828,8 @@
         </p:blipFill>
         <p:spPr bwMode="auto">
           <a:xfrm>
-            <a:off x="4290988" y="4495800"/>
-            <a:ext cx="4576788" cy="1952625"/>
+            <a:off x="1066800" y="1981200"/>
+            <a:ext cx="6965648" cy="2971800"/>
           </a:xfrm>
           <a:prstGeom prst="rect">
             <a:avLst/>
@@ -5277,32 +5585,19 @@
           <a:p>
             <a:r>
               <a:rPr lang="en-US" sz="2000" dirty="0" smtClean="0"/>
-              <a:t> </a:t>
-            </a:r>
+              <a:t>   I want to cancel out of adding a vehicle</a:t>
+            </a:r>
+          </a:p>
+          <a:p>
             <a:r>
               <a:rPr lang="en-US" sz="2000" dirty="0" smtClean="0"/>
-              <a:t>  I want to cancel out of adding a vehicle</a:t>
+              <a:t>   So that only the number of vehicles I want get added</a:t>
             </a:r>
           </a:p>
           <a:p>
             <a:r>
               <a:rPr lang="en-US" sz="2000" dirty="0" smtClean="0"/>
-              <a:t> </a:t>
-            </a:r>
-            <a:r>
-              <a:rPr lang="en-US" sz="2000" dirty="0" smtClean="0"/>
-              <a:t>  So that only the number of vehicles I want get added</a:t>
-            </a:r>
-            <a:endParaRPr lang="en-US" sz="2000" dirty="0" smtClean="0"/>
-          </a:p>
-          <a:p>
-            <a:r>
-              <a:rPr lang="en-US" sz="2000" dirty="0" smtClean="0"/>
-              <a:t>Background</a:t>
-            </a:r>
-            <a:r>
-              <a:rPr lang="en-US" sz="2000" dirty="0" smtClean="0"/>
-              <a:t>:</a:t>
+              <a:t>Background:</a:t>
             </a:r>
           </a:p>
           <a:p>
@@ -5314,13 +5609,8 @@
           <a:p>
             <a:r>
               <a:rPr lang="en-US" sz="2000" dirty="0" smtClean="0"/>
-              <a:t>    And </a:t>
-            </a:r>
-            <a:r>
-              <a:rPr lang="en-US" sz="2000" dirty="0" smtClean="0"/>
-              <a:t>I enter all the data up to Adding A Vehicle</a:t>
-            </a:r>
-            <a:endParaRPr lang="en-US" sz="2000" dirty="0" smtClean="0"/>
+              <a:t>    And I enter all the data up to Adding A Vehicle</a:t>
+            </a:r>
           </a:p>
           <a:p>
             <a:r>
@@ -5385,19 +5675,7 @@
           <a:p>
             <a:r>
               <a:rPr lang="en-US" sz="2000" dirty="0" smtClean="0"/>
-              <a:t>    Then I </a:t>
-            </a:r>
-            <a:r>
-              <a:rPr lang="en-US" sz="2000" dirty="0" smtClean="0"/>
-              <a:t>should not get the  </a:t>
-            </a:r>
-            <a:r>
-              <a:rPr lang="en-US" sz="2000" dirty="0" smtClean="0"/>
-              <a:t>error "Vehicle Garaging Location not </a:t>
-            </a:r>
-            <a:r>
-              <a:rPr lang="en-US" sz="2000" dirty="0" smtClean="0"/>
-              <a:t>specified"</a:t>
+              <a:t>    Then I should not get the  error "Vehicle Garaging Location not specified"</a:t>
             </a:r>
             <a:endParaRPr lang="en-US" sz="2000" dirty="0"/>
           </a:p>
@@ -5408,6 +5686,13 @@
   <p:clrMapOvr>
     <a:masterClrMapping/>
   </p:clrMapOvr>
+  <p:timing>
+    <p:tnLst>
+      <p:par>
+        <p:cTn id="1" dur="indefinite" restart="never" nodeType="tmRoot"/>
+      </p:par>
+    </p:tnLst>
+  </p:timing>
 </p:sld>
 </file>
 

</xml_diff>

<commit_message>
re-positioned an image on the 'Why BDD' slide
</commit_message>
<xml_diff>
--- a/Presentations/BDD Lunch & Learn.pptx
+++ b/Presentations/BDD Lunch & Learn.pptx
@@ -204,7 +204,7 @@
             <a:fld id="{1D091EE3-F36B-4F16-85E3-8659902D7611}" type="datetimeFigureOut">
               <a:rPr lang="en-US" smtClean="0"/>
               <a:pPr/>
-              <a:t>3/1/2011</a:t>
+              <a:t>3/1/11</a:t>
             </a:fld>
             <a:endParaRPr lang="en-US"/>
           </a:p>
@@ -375,7 +375,7 @@
     </p:spTree>
     <p:extLst>
       <p:ext uri="{BB962C8B-B14F-4D97-AF65-F5344CB8AC3E}">
-        <p14:creationId xmlns:p14="http://schemas.microsoft.com/office/powerpoint/2010/main" xmlns="" val="3371909597"/>
+        <p14:creationId xmlns:p14="http://schemas.microsoft.com/office/powerpoint/2010/main" val="3371909597"/>
       </p:ext>
     </p:extLst>
   </p:cSld>
@@ -1262,7 +1262,7 @@
             <a:fld id="{1653B05B-DD7C-4C23-878E-99C6F175D4D9}" type="datetimeFigureOut">
               <a:rPr lang="en-US" smtClean="0"/>
               <a:pPr/>
-              <a:t>3/1/2011</a:t>
+              <a:t>3/1/11</a:t>
             </a:fld>
             <a:endParaRPr lang="en-US"/>
           </a:p>
@@ -1429,7 +1429,7 @@
             <a:fld id="{1653B05B-DD7C-4C23-878E-99C6F175D4D9}" type="datetimeFigureOut">
               <a:rPr lang="en-US" smtClean="0"/>
               <a:pPr/>
-              <a:t>3/1/2011</a:t>
+              <a:t>3/1/11</a:t>
             </a:fld>
             <a:endParaRPr lang="en-US"/>
           </a:p>
@@ -1606,7 +1606,7 @@
             <a:fld id="{1653B05B-DD7C-4C23-878E-99C6F175D4D9}" type="datetimeFigureOut">
               <a:rPr lang="en-US" smtClean="0"/>
               <a:pPr/>
-              <a:t>3/1/2011</a:t>
+              <a:t>3/1/11</a:t>
             </a:fld>
             <a:endParaRPr lang="en-US"/>
           </a:p>
@@ -1773,7 +1773,7 @@
             <a:fld id="{1653B05B-DD7C-4C23-878E-99C6F175D4D9}" type="datetimeFigureOut">
               <a:rPr lang="en-US" smtClean="0"/>
               <a:pPr/>
-              <a:t>3/1/2011</a:t>
+              <a:t>3/1/11</a:t>
             </a:fld>
             <a:endParaRPr lang="en-US"/>
           </a:p>
@@ -2016,7 +2016,7 @@
             <a:fld id="{1653B05B-DD7C-4C23-878E-99C6F175D4D9}" type="datetimeFigureOut">
               <a:rPr lang="en-US" smtClean="0"/>
               <a:pPr/>
-              <a:t>3/1/2011</a:t>
+              <a:t>3/1/11</a:t>
             </a:fld>
             <a:endParaRPr lang="en-US"/>
           </a:p>
@@ -2301,7 +2301,7 @@
             <a:fld id="{1653B05B-DD7C-4C23-878E-99C6F175D4D9}" type="datetimeFigureOut">
               <a:rPr lang="en-US" smtClean="0"/>
               <a:pPr/>
-              <a:t>3/1/2011</a:t>
+              <a:t>3/1/11</a:t>
             </a:fld>
             <a:endParaRPr lang="en-US"/>
           </a:p>
@@ -2720,7 +2720,7 @@
             <a:fld id="{1653B05B-DD7C-4C23-878E-99C6F175D4D9}" type="datetimeFigureOut">
               <a:rPr lang="en-US" smtClean="0"/>
               <a:pPr/>
-              <a:t>3/1/2011</a:t>
+              <a:t>3/1/11</a:t>
             </a:fld>
             <a:endParaRPr lang="en-US"/>
           </a:p>
@@ -2835,7 +2835,7 @@
             <a:fld id="{1653B05B-DD7C-4C23-878E-99C6F175D4D9}" type="datetimeFigureOut">
               <a:rPr lang="en-US" smtClean="0"/>
               <a:pPr/>
-              <a:t>3/1/2011</a:t>
+              <a:t>3/1/11</a:t>
             </a:fld>
             <a:endParaRPr lang="en-US"/>
           </a:p>
@@ -2927,7 +2927,7 @@
             <a:fld id="{1653B05B-DD7C-4C23-878E-99C6F175D4D9}" type="datetimeFigureOut">
               <a:rPr lang="en-US" smtClean="0"/>
               <a:pPr/>
-              <a:t>3/1/2011</a:t>
+              <a:t>3/1/11</a:t>
             </a:fld>
             <a:endParaRPr lang="en-US"/>
           </a:p>
@@ -3201,7 +3201,7 @@
             <a:fld id="{1653B05B-DD7C-4C23-878E-99C6F175D4D9}" type="datetimeFigureOut">
               <a:rPr lang="en-US" smtClean="0"/>
               <a:pPr/>
-              <a:t>3/1/2011</a:t>
+              <a:t>3/1/11</a:t>
             </a:fld>
             <a:endParaRPr lang="en-US"/>
           </a:p>
@@ -3451,7 +3451,7 @@
             <a:fld id="{1653B05B-DD7C-4C23-878E-99C6F175D4D9}" type="datetimeFigureOut">
               <a:rPr lang="en-US" smtClean="0"/>
               <a:pPr/>
-              <a:t>3/1/2011</a:t>
+              <a:t>3/1/11</a:t>
             </a:fld>
             <a:endParaRPr lang="en-US"/>
           </a:p>
@@ -3661,7 +3661,7 @@
             <a:fld id="{1653B05B-DD7C-4C23-878E-99C6F175D4D9}" type="datetimeFigureOut">
               <a:rPr lang="en-US" smtClean="0"/>
               <a:pPr/>
-              <a:t>3/1/2011</a:t>
+              <a:t>3/1/11</a:t>
             </a:fld>
             <a:endParaRPr lang="en-US"/>
           </a:p>
@@ -4082,7 +4082,7 @@
   <p:timing>
     <p:tnLst>
       <p:par>
-        <p:cTn id="1" dur="indefinite" restart="never" nodeType="tmRoot"/>
+        <p:cTn xmlns:p14="http://schemas.microsoft.com/office/powerpoint/2010/main" id="1" dur="indefinite" restart="never" nodeType="tmRoot"/>
       </p:par>
     </p:tnLst>
   </p:timing>
@@ -4144,9 +4144,84 @@
         </p:xfrm>
         <a:graphic>
           <a:graphicData uri="http://schemas.openxmlformats.org/presentationml/2006/ole">
-            <p:oleObj spid="_x0000_s1029" name="VISIO" r:id="rId4" imgW="2066400" imgH="203760" progId="Visio.Drawing.11">
-              <p:embed/>
-            </p:oleObj>
+            <mc:AlternateContent xmlns:mc="http://schemas.openxmlformats.org/markup-compatibility/2006">
+              <mc:Choice xmlns:v="urn:schemas-microsoft-com:vml" Requires="v">
+                <p:oleObj spid="_x0000_s1031" name="VISIO" r:id="rId4" imgW="2066400" imgH="203760" progId="Visio.Drawing.11">
+                  <p:embed/>
+                </p:oleObj>
+              </mc:Choice>
+              <mc:Fallback>
+                <p:oleObj name="VISIO" r:id="rId4" imgW="2066400" imgH="203760" progId="Visio.Drawing.11">
+                  <p:embed/>
+                  <p:pic>
+                    <p:nvPicPr>
+                      <p:cNvPr id="0" name="Picture 5"/>
+                      <p:cNvPicPr>
+                        <a:picLocks noGrp="1" noChangeAspect="1" noChangeArrowheads="1"/>
+                      </p:cNvPicPr>
+                      <p:nvPr/>
+                    </p:nvPicPr>
+                    <p:blipFill>
+                      <a:blip r:embed="rId5">
+                        <a:extLst>
+                          <a:ext uri="{28A0092B-C50C-407E-A947-70E740481C1C}">
+                            <a14:useLocalDpi xmlns:a14="http://schemas.microsoft.com/office/drawing/2010/main" val="0"/>
+                          </a:ext>
+                        </a:extLst>
+                      </a:blip>
+                      <a:srcRect/>
+                      <a:stretch>
+                        <a:fillRect/>
+                      </a:stretch>
+                    </p:blipFill>
+                    <p:spPr bwMode="auto">
+                      <a:xfrm>
+                        <a:off x="2209800" y="1295400"/>
+                        <a:ext cx="4724400" cy="465138"/>
+                      </a:xfrm>
+                      <a:prstGeom prst="rect">
+                        <a:avLst/>
+                      </a:prstGeom>
+                      <a:noFill/>
+                      <a:ln>
+                        <a:noFill/>
+                      </a:ln>
+                      <a:effectLst/>
+                      <a:extLst>
+                        <a:ext uri="{909E8E84-426E-40dd-AFC4-6F175D3DCCD1}">
+                          <a14:hiddenFill xmlns:a14="http://schemas.microsoft.com/office/drawing/2010/main">
+                            <a:solidFill>
+                              <a:schemeClr val="accent1"/>
+                            </a:solidFill>
+                          </a14:hiddenFill>
+                        </a:ext>
+                        <a:ext uri="{91240B29-F687-4f45-9708-019B960494DF}">
+                          <a14:hiddenLine xmlns:a14="http://schemas.microsoft.com/office/drawing/2010/main" w="9525">
+                            <a:solidFill>
+                              <a:schemeClr val="tx1"/>
+                            </a:solidFill>
+                            <a:miter lim="800000"/>
+                            <a:headEnd/>
+                            <a:tailEnd/>
+                          </a14:hiddenLine>
+                        </a:ext>
+                        <a:ext uri="{AF507438-7753-43e0-B8FC-AC1667EBCBE1}">
+                          <a14:hiddenEffects xmlns:a14="http://schemas.microsoft.com/office/drawing/2010/main">
+                            <a:effectLst>
+                              <a:outerShdw blurRad="63500" dist="38097" dir="2700000" algn="ctr" rotWithShape="0">
+                                <a:schemeClr val="bg2">
+                                  <a:alpha val="74997"/>
+                                </a:schemeClr>
+                              </a:outerShdw>
+                            </a:effectLst>
+                          </a14:hiddenEffects>
+                        </a:ext>
+                      </a:extLst>
+                    </p:spPr>
+                  </p:pic>
+                </p:oleObj>
+              </mc:Fallback>
+            </mc:AlternateContent>
           </a:graphicData>
         </a:graphic>
       </p:graphicFrame>
@@ -4301,7 +4376,7 @@
   <p:timing>
     <p:tnLst>
       <p:par>
-        <p:cTn id="1" dur="indefinite" restart="never" nodeType="tmRoot"/>
+        <p:cTn xmlns:p14="http://schemas.microsoft.com/office/powerpoint/2010/main" id="1" dur="indefinite" restart="never" nodeType="tmRoot"/>
       </p:par>
     </p:tnLst>
   </p:timing>
@@ -4382,11 +4457,7 @@
           <a:p>
             <a:r>
               <a:rPr lang="en-US" sz="2800" dirty="0" smtClean="0"/>
-              <a:t>http</a:t>
-            </a:r>
-            <a:r>
-              <a:rPr lang="en-US" sz="2800" dirty="0" smtClean="0"/>
-              <a:t>://groups.google.com/group/cukes</a:t>
+              <a:t>http://groups.google.com/group/cukes</a:t>
             </a:r>
           </a:p>
           <a:p>
@@ -4394,13 +4465,7 @@
               <a:rPr lang="en-US" sz="2800" dirty="0" smtClean="0">
                 <a:hlinkClick r:id="rId3"/>
               </a:rPr>
-              <a:t>http://</a:t>
-            </a:r>
-            <a:r>
-              <a:rPr lang="en-US" sz="2800" dirty="0" smtClean="0">
-                <a:hlinkClick r:id="rId3"/>
-              </a:rPr>
-              <a:t>www.cheezyworld.com</a:t>
+              <a:t>http://www.cheezyworld.com</a:t>
             </a:r>
             <a:endParaRPr lang="en-US" sz="2800" dirty="0" smtClean="0"/>
           </a:p>
@@ -4472,7 +4537,7 @@
   <p:timing>
     <p:tnLst>
       <p:par>
-        <p:cTn id="1" dur="indefinite" restart="never" nodeType="tmRoot"/>
+        <p:cTn xmlns:p14="http://schemas.microsoft.com/office/powerpoint/2010/main" id="1" dur="indefinite" restart="never" nodeType="tmRoot"/>
       </p:par>
     </p:tnLst>
   </p:timing>
@@ -4625,7 +4690,7 @@
   <p:timing>
     <p:tnLst>
       <p:par>
-        <p:cTn id="1" dur="indefinite" restart="never" nodeType="tmRoot"/>
+        <p:cTn xmlns:p14="http://schemas.microsoft.com/office/powerpoint/2010/main" id="1" dur="indefinite" restart="never" nodeType="tmRoot"/>
       </p:par>
     </p:tnLst>
   </p:timing>
@@ -4666,7 +4731,7 @@
         </p:blipFill>
         <p:spPr bwMode="auto">
           <a:xfrm>
-            <a:off x="5924550" y="3581400"/>
+            <a:off x="5848350" y="3505200"/>
             <a:ext cx="3219450" cy="3276600"/>
           </a:xfrm>
           <a:prstGeom prst="rect">
@@ -4755,7 +4820,7 @@
   <p:timing>
     <p:tnLst>
       <p:par>
-        <p:cTn id="1" dur="indefinite" restart="never" nodeType="tmRoot"/>
+        <p:cTn xmlns:p14="http://schemas.microsoft.com/office/powerpoint/2010/main" id="1" dur="indefinite" restart="never" nodeType="tmRoot"/>
       </p:par>
     </p:tnLst>
   </p:timing>
@@ -4851,7 +4916,7 @@
   <p:timing>
     <p:tnLst>
       <p:par>
-        <p:cTn id="1" dur="indefinite" restart="never" nodeType="tmRoot"/>
+        <p:cTn xmlns:p14="http://schemas.microsoft.com/office/powerpoint/2010/main" id="1" dur="indefinite" restart="never" nodeType="tmRoot"/>
       </p:par>
     </p:tnLst>
   </p:timing>
@@ -4957,7 +5022,7 @@
   <p:timing>
     <p:tnLst>
       <p:par>
-        <p:cTn id="1" dur="indefinite" restart="never" nodeType="tmRoot"/>
+        <p:cTn xmlns:p14="http://schemas.microsoft.com/office/powerpoint/2010/main" id="1" dur="indefinite" restart="never" nodeType="tmRoot"/>
       </p:par>
     </p:tnLst>
   </p:timing>
@@ -5120,7 +5185,7 @@
   <p:timing>
     <p:tnLst>
       <p:par>
-        <p:cTn id="1" dur="indefinite" restart="never" nodeType="tmRoot"/>
+        <p:cTn xmlns:p14="http://schemas.microsoft.com/office/powerpoint/2010/main" id="1" dur="indefinite" restart="never" nodeType="tmRoot"/>
       </p:par>
     </p:tnLst>
   </p:timing>
@@ -5244,7 +5309,7 @@
   <p:timing>
     <p:tnLst>
       <p:par>
-        <p:cTn id="1" dur="indefinite" restart="never" nodeType="tmRoot"/>
+        <p:cTn xmlns:p14="http://schemas.microsoft.com/office/powerpoint/2010/main" id="1" dur="indefinite" restart="never" nodeType="tmRoot"/>
       </p:par>
     </p:tnLst>
   </p:timing>
@@ -5387,7 +5452,7 @@
   <p:timing>
     <p:tnLst>
       <p:par>
-        <p:cTn id="1" dur="indefinite" restart="never" nodeType="tmRoot"/>
+        <p:cTn xmlns:p14="http://schemas.microsoft.com/office/powerpoint/2010/main" id="1" dur="indefinite" restart="never" nodeType="tmRoot"/>
       </p:par>
     </p:tnLst>
   </p:timing>
@@ -5526,7 +5591,7 @@
   <p:timing>
     <p:tnLst>
       <p:par>
-        <p:cTn id="1" dur="indefinite" restart="never" nodeType="tmRoot"/>
+        <p:cTn xmlns:p14="http://schemas.microsoft.com/office/powerpoint/2010/main" id="1" dur="indefinite" restart="never" nodeType="tmRoot"/>
       </p:par>
     </p:tnLst>
   </p:timing>
@@ -5689,7 +5754,7 @@
   <p:timing>
     <p:tnLst>
       <p:par>
-        <p:cTn id="1" dur="indefinite" restart="never" nodeType="tmRoot"/>
+        <p:cTn xmlns:p14="http://schemas.microsoft.com/office/powerpoint/2010/main" id="1" dur="indefinite" restart="never" nodeType="tmRoot"/>
       </p:par>
     </p:tnLst>
   </p:timing>

</xml_diff>

<commit_message>
I guess there are presentation mods?
</commit_message>
<xml_diff>
--- a/Presentations/BDD Lunch & Learn.pptx
+++ b/Presentations/BDD Lunch & Learn.pptx
@@ -18,8 +18,8 @@
     <p:sldId id="266" r:id="rId9"/>
     <p:sldId id="268" r:id="rId10"/>
     <p:sldId id="260" r:id="rId11"/>
-    <p:sldId id="267" r:id="rId12"/>
-    <p:sldId id="261" r:id="rId13"/>
+    <p:sldId id="261" r:id="rId12"/>
+    <p:sldId id="267" r:id="rId13"/>
   </p:sldIdLst>
   <p:sldSz cx="9144000" cy="6858000" type="screen4x3"/>
   <p:notesSz cx="6858000" cy="9144000"/>
@@ -204,7 +204,7 @@
             <a:fld id="{1D091EE3-F36B-4F16-85E3-8659902D7611}" type="datetimeFigureOut">
               <a:rPr lang="en-US" smtClean="0"/>
               <a:pPr/>
-              <a:t>3/1/11</a:t>
+              <a:t>3/2/11</a:t>
             </a:fld>
             <a:endParaRPr lang="en-US"/>
           </a:p>
@@ -1262,7 +1262,7 @@
             <a:fld id="{1653B05B-DD7C-4C23-878E-99C6F175D4D9}" type="datetimeFigureOut">
               <a:rPr lang="en-US" smtClean="0"/>
               <a:pPr/>
-              <a:t>3/1/11</a:t>
+              <a:t>3/2/11</a:t>
             </a:fld>
             <a:endParaRPr lang="en-US"/>
           </a:p>
@@ -1429,7 +1429,7 @@
             <a:fld id="{1653B05B-DD7C-4C23-878E-99C6F175D4D9}" type="datetimeFigureOut">
               <a:rPr lang="en-US" smtClean="0"/>
               <a:pPr/>
-              <a:t>3/1/11</a:t>
+              <a:t>3/2/11</a:t>
             </a:fld>
             <a:endParaRPr lang="en-US"/>
           </a:p>
@@ -1606,7 +1606,7 @@
             <a:fld id="{1653B05B-DD7C-4C23-878E-99C6F175D4D9}" type="datetimeFigureOut">
               <a:rPr lang="en-US" smtClean="0"/>
               <a:pPr/>
-              <a:t>3/1/11</a:t>
+              <a:t>3/2/11</a:t>
             </a:fld>
             <a:endParaRPr lang="en-US"/>
           </a:p>
@@ -1773,7 +1773,7 @@
             <a:fld id="{1653B05B-DD7C-4C23-878E-99C6F175D4D9}" type="datetimeFigureOut">
               <a:rPr lang="en-US" smtClean="0"/>
               <a:pPr/>
-              <a:t>3/1/11</a:t>
+              <a:t>3/2/11</a:t>
             </a:fld>
             <a:endParaRPr lang="en-US"/>
           </a:p>
@@ -2016,7 +2016,7 @@
             <a:fld id="{1653B05B-DD7C-4C23-878E-99C6F175D4D9}" type="datetimeFigureOut">
               <a:rPr lang="en-US" smtClean="0"/>
               <a:pPr/>
-              <a:t>3/1/11</a:t>
+              <a:t>3/2/11</a:t>
             </a:fld>
             <a:endParaRPr lang="en-US"/>
           </a:p>
@@ -2301,7 +2301,7 @@
             <a:fld id="{1653B05B-DD7C-4C23-878E-99C6F175D4D9}" type="datetimeFigureOut">
               <a:rPr lang="en-US" smtClean="0"/>
               <a:pPr/>
-              <a:t>3/1/11</a:t>
+              <a:t>3/2/11</a:t>
             </a:fld>
             <a:endParaRPr lang="en-US"/>
           </a:p>
@@ -2720,7 +2720,7 @@
             <a:fld id="{1653B05B-DD7C-4C23-878E-99C6F175D4D9}" type="datetimeFigureOut">
               <a:rPr lang="en-US" smtClean="0"/>
               <a:pPr/>
-              <a:t>3/1/11</a:t>
+              <a:t>3/2/11</a:t>
             </a:fld>
             <a:endParaRPr lang="en-US"/>
           </a:p>
@@ -2835,7 +2835,7 @@
             <a:fld id="{1653B05B-DD7C-4C23-878E-99C6F175D4D9}" type="datetimeFigureOut">
               <a:rPr lang="en-US" smtClean="0"/>
               <a:pPr/>
-              <a:t>3/1/11</a:t>
+              <a:t>3/2/11</a:t>
             </a:fld>
             <a:endParaRPr lang="en-US"/>
           </a:p>
@@ -2927,7 +2927,7 @@
             <a:fld id="{1653B05B-DD7C-4C23-878E-99C6F175D4D9}" type="datetimeFigureOut">
               <a:rPr lang="en-US" smtClean="0"/>
               <a:pPr/>
-              <a:t>3/1/11</a:t>
+              <a:t>3/2/11</a:t>
             </a:fld>
             <a:endParaRPr lang="en-US"/>
           </a:p>
@@ -3201,7 +3201,7 @@
             <a:fld id="{1653B05B-DD7C-4C23-878E-99C6F175D4D9}" type="datetimeFigureOut">
               <a:rPr lang="en-US" smtClean="0"/>
               <a:pPr/>
-              <a:t>3/1/11</a:t>
+              <a:t>3/2/11</a:t>
             </a:fld>
             <a:endParaRPr lang="en-US"/>
           </a:p>
@@ -3451,7 +3451,7 @@
             <a:fld id="{1653B05B-DD7C-4C23-878E-99C6F175D4D9}" type="datetimeFigureOut">
               <a:rPr lang="en-US" smtClean="0"/>
               <a:pPr/>
-              <a:t>3/1/11</a:t>
+              <a:t>3/2/11</a:t>
             </a:fld>
             <a:endParaRPr lang="en-US"/>
           </a:p>
@@ -3661,7 +3661,7 @@
             <a:fld id="{1653B05B-DD7C-4C23-878E-99C6F175D4D9}" type="datetimeFigureOut">
               <a:rPr lang="en-US" smtClean="0"/>
               <a:pPr/>
-              <a:t>3/1/11</a:t>
+              <a:t>3/2/11</a:t>
             </a:fld>
             <a:endParaRPr lang="en-US"/>
           </a:p>
@@ -4070,7 +4070,11 @@
           <a:bodyPr/>
           <a:lstStyle/>
           <a:p>
-            <a:endParaRPr lang="en-US"/>
+            <a:r>
+              <a:rPr lang="en-US" dirty="0" smtClean="0"/>
+              <a:t>March 2, 2011</a:t>
+            </a:r>
+            <a:endParaRPr lang="en-US" dirty="0"/>
           </a:p>
         </p:txBody>
       </p:sp>
@@ -4146,7 +4150,7 @@
           <a:graphicData uri="http://schemas.openxmlformats.org/presentationml/2006/ole">
             <mc:AlternateContent xmlns:mc="http://schemas.openxmlformats.org/markup-compatibility/2006">
               <mc:Choice xmlns:v="urn:schemas-microsoft-com:vml" Requires="v">
-                <p:oleObj spid="_x0000_s1031" name="VISIO" r:id="rId4" imgW="2066400" imgH="203760" progId="Visio.Drawing.11">
+                <p:oleObj spid="_x0000_s1038" name="VISIO" r:id="rId4" imgW="2066400" imgH="203760" progId="Visio.Drawing.11">
                   <p:embed/>
                 </p:oleObj>
               </mc:Choice>
@@ -4384,7 +4388,7 @@
 </file>
 
 <file path=ppt/slides/slide11.xml><?xml version="1.0" encoding="utf-8"?>
-<p:sld xmlns:a="http://schemas.openxmlformats.org/drawingml/2006/main" xmlns:r="http://schemas.openxmlformats.org/officeDocument/2006/relationships" xmlns:p="http://schemas.openxmlformats.org/presentationml/2006/main">
+<p:sld xmlns:a="http://schemas.openxmlformats.org/drawingml/2006/main" xmlns:r="http://schemas.openxmlformats.org/officeDocument/2006/relationships" xmlns:p="http://schemas.openxmlformats.org/presentationml/2006/main" show="0">
   <p:cSld>
     <p:spTree>
       <p:nvGrpSpPr>
@@ -4402,130 +4406,122 @@
       </p:grpSpPr>
       <p:sp>
         <p:nvSpPr>
-          <p:cNvPr id="2" name="Title 1"/>
-          <p:cNvSpPr>
-            <a:spLocks noGrp="1"/>
-          </p:cNvSpPr>
-          <p:nvPr>
-            <p:ph type="title"/>
-          </p:nvPr>
-        </p:nvSpPr>
-        <p:spPr/>
-        <p:txBody>
-          <a:bodyPr/>
-          <a:lstStyle/>
-          <a:p>
+          <p:cNvPr id="5" name="Content Placeholder 4"/>
+          <p:cNvSpPr>
+            <a:spLocks noGrp="1"/>
+          </p:cNvSpPr>
+          <p:nvPr>
+            <p:ph sz="half" idx="1"/>
+          </p:nvPr>
+        </p:nvSpPr>
+        <p:spPr>
+          <a:xfrm>
+            <a:off x="457200" y="381000"/>
+            <a:ext cx="4038600" cy="5745163"/>
+          </a:xfrm>
+        </p:spPr>
+        <p:txBody>
+          <a:bodyPr/>
+          <a:lstStyle/>
+          <a:p>
+            <a:pPr marL="0" indent="0" algn="ctr">
+              <a:buNone/>
+            </a:pPr>
             <a:r>
               <a:rPr lang="en-US" dirty="0" smtClean="0"/>
-              <a:t>For more info…</a:t>
-            </a:r>
-            <a:endParaRPr lang="en-US" dirty="0"/>
-          </a:p>
-        </p:txBody>
-      </p:sp>
-      <p:sp>
-        <p:nvSpPr>
-          <p:cNvPr id="3" name="Content Placeholder 2"/>
-          <p:cNvSpPr>
-            <a:spLocks noGrp="1"/>
-          </p:cNvSpPr>
-          <p:nvPr>
-            <p:ph idx="1"/>
-          </p:nvPr>
-        </p:nvSpPr>
-        <p:spPr/>
-        <p:txBody>
-          <a:bodyPr>
-            <a:normAutofit/>
-          </a:bodyPr>
-          <a:lstStyle/>
-          <a:p>
-            <a:r>
-              <a:rPr lang="en-US" sz="2800" dirty="0" smtClean="0"/>
-              <a:t>cukes.info</a:t>
-            </a:r>
-          </a:p>
-          <a:p>
-            <a:r>
-              <a:rPr lang="en-US" sz="2800" dirty="0" smtClean="0">
+              <a:t>Shawn Wallace</a:t>
+            </a:r>
+          </a:p>
+          <a:p>
+            <a:pPr marL="0" indent="0">
+              <a:buNone/>
+            </a:pPr>
+            <a:endParaRPr lang="en-US" sz="1600" dirty="0" smtClean="0"/>
+          </a:p>
+          <a:p>
+            <a:pPr marL="0" indent="0">
+              <a:buNone/>
+            </a:pPr>
+            <a:r>
+              <a:rPr lang="en-US" sz="1600" dirty="0" smtClean="0">
                 <a:hlinkClick r:id="rId2"/>
               </a:rPr>
-              <a:t>https://github.com/aslakhellesoy/cucumber/wiki</a:t>
-            </a:r>
-            <a:endParaRPr lang="en-US" sz="2800" dirty="0" smtClean="0"/>
-          </a:p>
-          <a:p>
-            <a:r>
-              <a:rPr lang="en-US" sz="2800" dirty="0" smtClean="0"/>
-              <a:t>http://groups.google.com/group/cukes</a:t>
-            </a:r>
-          </a:p>
-          <a:p>
-            <a:r>
-              <a:rPr lang="en-US" sz="2800" dirty="0" smtClean="0">
+              <a:t>c-wallas@grangeinsurance.com</a:t>
+            </a:r>
+            <a:endParaRPr lang="en-US" sz="1600" dirty="0" smtClean="0"/>
+          </a:p>
+          <a:p>
+            <a:pPr marL="0" indent="0">
+              <a:buNone/>
+            </a:pPr>
+            <a:r>
+              <a:rPr lang="en-US" sz="1600" dirty="0" smtClean="0"/>
+              <a:t>614.270-1600</a:t>
+            </a:r>
+            <a:endParaRPr lang="en-US" sz="1600" dirty="0"/>
+          </a:p>
+        </p:txBody>
+      </p:sp>
+      <p:sp>
+        <p:nvSpPr>
+          <p:cNvPr id="6" name="Content Placeholder 5"/>
+          <p:cNvSpPr>
+            <a:spLocks noGrp="1"/>
+          </p:cNvSpPr>
+          <p:nvPr>
+            <p:ph sz="half" idx="2"/>
+          </p:nvPr>
+        </p:nvSpPr>
+        <p:spPr>
+          <a:xfrm>
+            <a:off x="4648200" y="381000"/>
+            <a:ext cx="4038600" cy="5745163"/>
+          </a:xfrm>
+        </p:spPr>
+        <p:txBody>
+          <a:bodyPr/>
+          <a:lstStyle/>
+          <a:p>
+            <a:pPr algn="ctr">
+              <a:buNone/>
+            </a:pPr>
+            <a:r>
+              <a:rPr lang="en-US" dirty="0" smtClean="0"/>
+              <a:t>Andy Vida</a:t>
+            </a:r>
+          </a:p>
+          <a:p>
+            <a:pPr algn="ctr">
+              <a:buNone/>
+            </a:pPr>
+            <a:endParaRPr lang="en-US" sz="1600" dirty="0" smtClean="0"/>
+          </a:p>
+          <a:p>
+            <a:pPr marL="0" indent="0">
+              <a:buNone/>
+            </a:pPr>
+            <a:r>
+              <a:rPr lang="en-US" sz="1600" dirty="0" smtClean="0">
                 <a:hlinkClick r:id="rId3"/>
               </a:rPr>
-              <a:t>http://www.cheezyworld.com</a:t>
-            </a:r>
-            <a:endParaRPr lang="en-US" sz="2800" dirty="0" smtClean="0"/>
-          </a:p>
-          <a:p>
-            <a:r>
-              <a:rPr lang="en-US" sz="2800" dirty="0" smtClean="0"/>
-              <a:t>Samples and Presentation:  </a:t>
-            </a:r>
-            <a:r>
-              <a:rPr lang="en-US" sz="2800" dirty="0" err="1" smtClean="0">
-                <a:hlinkClick r:id="rId4"/>
-              </a:rPr>
-              <a:t>git@github.com:shawnewallace</a:t>
-            </a:r>
-            <a:r>
-              <a:rPr lang="en-US" sz="2800" dirty="0" smtClean="0">
-                <a:hlinkClick r:id="rId4"/>
-              </a:rPr>
-              <a:t>/Katas.git</a:t>
-            </a:r>
-            <a:endParaRPr lang="en-US" sz="2800" dirty="0" smtClean="0"/>
-          </a:p>
-          <a:p>
-            <a:r>
-              <a:rPr lang="en-US" sz="2800" u="sng" dirty="0" smtClean="0"/>
-              <a:t>The </a:t>
-            </a:r>
-            <a:r>
-              <a:rPr lang="en-US" sz="2800" u="sng" dirty="0" err="1" smtClean="0"/>
-              <a:t>Rspec</a:t>
-            </a:r>
-            <a:r>
-              <a:rPr lang="en-US" sz="2800" u="sng" dirty="0" smtClean="0"/>
-              <a:t> Book</a:t>
-            </a:r>
-            <a:r>
-              <a:rPr lang="en-US" sz="2800" dirty="0" smtClean="0"/>
-              <a:t>, David </a:t>
-            </a:r>
-            <a:r>
-              <a:rPr lang="en-US" sz="2800" dirty="0" err="1" smtClean="0"/>
-              <a:t>Chelimsky</a:t>
-            </a:r>
-            <a:r>
-              <a:rPr lang="en-US" sz="2800" dirty="0" smtClean="0"/>
-              <a:t>:  </a:t>
-            </a:r>
-            <a:r>
-              <a:rPr lang="en-US" sz="2800" dirty="0" smtClean="0">
-                <a:hlinkClick r:id="rId5"/>
-              </a:rPr>
-              <a:t>http://www.pragprog.com/titles/achbd/the-rspec-book</a:t>
-            </a:r>
-            <a:endParaRPr lang="en-US" sz="2800" dirty="0" smtClean="0"/>
-          </a:p>
-          <a:p>
-            <a:endParaRPr lang="en-US" sz="2800" dirty="0" smtClean="0"/>
-          </a:p>
-          <a:p>
-            <a:endParaRPr lang="en-US" sz="2800" dirty="0"/>
+              <a:t>vidaa@grangeinsurance.com</a:t>
+            </a:r>
+            <a:endParaRPr lang="en-US" sz="1600" dirty="0" smtClean="0"/>
+          </a:p>
+          <a:p>
+            <a:pPr marL="0" indent="0">
+              <a:buNone/>
+            </a:pPr>
+            <a:r>
+              <a:rPr lang="en-US" sz="1600" dirty="0" smtClean="0"/>
+              <a:t>614-445-2784</a:t>
+            </a:r>
+          </a:p>
+          <a:p>
+            <a:pPr>
+              <a:buNone/>
+            </a:pPr>
+            <a:endParaRPr lang="en-US" dirty="0"/>
           </a:p>
         </p:txBody>
       </p:sp>
@@ -4534,6 +4530,14 @@
   <p:clrMapOvr>
     <a:masterClrMapping/>
   </p:clrMapOvr>
+  <mc:AlternateContent xmlns:mc="http://schemas.openxmlformats.org/markup-compatibility/2006">
+    <mc:Choice xmlns:p14="http://schemas.microsoft.com/office/powerpoint/2010/main" Requires="p14">
+      <p:transition spd="slow" p14:dur="2000"/>
+    </mc:Choice>
+    <mc:Fallback>
+      <p:transition xmlns:p14="http://schemas.microsoft.com/office/powerpoint/2010/main" spd="slow"/>
+    </mc:Fallback>
+  </mc:AlternateContent>
   <p:timing>
     <p:tnLst>
       <p:par>
@@ -4563,122 +4567,130 @@
       </p:grpSpPr>
       <p:sp>
         <p:nvSpPr>
-          <p:cNvPr id="5" name="Content Placeholder 4"/>
-          <p:cNvSpPr>
-            <a:spLocks noGrp="1"/>
-          </p:cNvSpPr>
-          <p:nvPr>
-            <p:ph sz="half" idx="1"/>
-          </p:nvPr>
-        </p:nvSpPr>
-        <p:spPr>
-          <a:xfrm>
-            <a:off x="457200" y="381000"/>
-            <a:ext cx="4038600" cy="5745163"/>
-          </a:xfrm>
-        </p:spPr>
-        <p:txBody>
-          <a:bodyPr/>
-          <a:lstStyle/>
-          <a:p>
-            <a:pPr marL="0" indent="0" algn="ctr">
-              <a:buNone/>
-            </a:pPr>
+          <p:cNvPr id="2" name="Title 1"/>
+          <p:cNvSpPr>
+            <a:spLocks noGrp="1"/>
+          </p:cNvSpPr>
+          <p:nvPr>
+            <p:ph type="title"/>
+          </p:nvPr>
+        </p:nvSpPr>
+        <p:spPr/>
+        <p:txBody>
+          <a:bodyPr/>
+          <a:lstStyle/>
+          <a:p>
             <a:r>
               <a:rPr lang="en-US" dirty="0" smtClean="0"/>
-              <a:t>Shawn Wallace</a:t>
-            </a:r>
-          </a:p>
-          <a:p>
-            <a:pPr marL="0" indent="0">
-              <a:buNone/>
-            </a:pPr>
-            <a:endParaRPr lang="en-US" sz="1600" dirty="0" smtClean="0"/>
-          </a:p>
-          <a:p>
-            <a:pPr marL="0" indent="0">
-              <a:buNone/>
-            </a:pPr>
-            <a:r>
-              <a:rPr lang="en-US" sz="1600" dirty="0" smtClean="0">
+              <a:t>For more info…</a:t>
+            </a:r>
+            <a:endParaRPr lang="en-US" dirty="0"/>
+          </a:p>
+        </p:txBody>
+      </p:sp>
+      <p:sp>
+        <p:nvSpPr>
+          <p:cNvPr id="3" name="Content Placeholder 2"/>
+          <p:cNvSpPr>
+            <a:spLocks noGrp="1"/>
+          </p:cNvSpPr>
+          <p:nvPr>
+            <p:ph idx="1"/>
+          </p:nvPr>
+        </p:nvSpPr>
+        <p:spPr/>
+        <p:txBody>
+          <a:bodyPr>
+            <a:normAutofit/>
+          </a:bodyPr>
+          <a:lstStyle/>
+          <a:p>
+            <a:r>
+              <a:rPr lang="en-US" sz="2800" dirty="0" smtClean="0"/>
+              <a:t>cukes.info</a:t>
+            </a:r>
+          </a:p>
+          <a:p>
+            <a:r>
+              <a:rPr lang="en-US" sz="2800" dirty="0" smtClean="0">
                 <a:hlinkClick r:id="rId2"/>
               </a:rPr>
-              <a:t>c-wallas@grangeinsurance.com</a:t>
-            </a:r>
-            <a:endParaRPr lang="en-US" sz="1600" dirty="0" smtClean="0"/>
-          </a:p>
-          <a:p>
-            <a:pPr marL="0" indent="0">
-              <a:buNone/>
-            </a:pPr>
-            <a:r>
-              <a:rPr lang="en-US" sz="1600" dirty="0" smtClean="0"/>
-              <a:t>614.270-1600</a:t>
-            </a:r>
-            <a:endParaRPr lang="en-US" sz="1600" dirty="0"/>
-          </a:p>
-        </p:txBody>
-      </p:sp>
-      <p:sp>
-        <p:nvSpPr>
-          <p:cNvPr id="6" name="Content Placeholder 5"/>
-          <p:cNvSpPr>
-            <a:spLocks noGrp="1"/>
-          </p:cNvSpPr>
-          <p:nvPr>
-            <p:ph sz="half" idx="2"/>
-          </p:nvPr>
-        </p:nvSpPr>
-        <p:spPr>
-          <a:xfrm>
-            <a:off x="4648200" y="381000"/>
-            <a:ext cx="4038600" cy="5745163"/>
-          </a:xfrm>
-        </p:spPr>
-        <p:txBody>
-          <a:bodyPr/>
-          <a:lstStyle/>
-          <a:p>
-            <a:pPr algn="ctr">
-              <a:buNone/>
-            </a:pPr>
-            <a:r>
-              <a:rPr lang="en-US" dirty="0" smtClean="0"/>
-              <a:t>Andy Vida</a:t>
-            </a:r>
-          </a:p>
-          <a:p>
-            <a:pPr algn="ctr">
-              <a:buNone/>
-            </a:pPr>
-            <a:endParaRPr lang="en-US" sz="1600" dirty="0" smtClean="0"/>
-          </a:p>
-          <a:p>
-            <a:pPr marL="0" indent="0">
-              <a:buNone/>
-            </a:pPr>
-            <a:r>
-              <a:rPr lang="en-US" sz="1600" dirty="0" smtClean="0">
+              <a:t>https://github.com/aslakhellesoy/cucumber/wiki</a:t>
+            </a:r>
+            <a:endParaRPr lang="en-US" sz="2800" dirty="0" smtClean="0"/>
+          </a:p>
+          <a:p>
+            <a:r>
+              <a:rPr lang="en-US" sz="2800" dirty="0" smtClean="0"/>
+              <a:t>http://groups.google.com/group/cukes</a:t>
+            </a:r>
+          </a:p>
+          <a:p>
+            <a:r>
+              <a:rPr lang="en-US" sz="2800" dirty="0" smtClean="0">
                 <a:hlinkClick r:id="rId3"/>
               </a:rPr>
-              <a:t>vidaa@grangeinsurance.com</a:t>
-            </a:r>
-            <a:endParaRPr lang="en-US" sz="1600" dirty="0" smtClean="0"/>
-          </a:p>
-          <a:p>
-            <a:pPr marL="0" indent="0">
-              <a:buNone/>
-            </a:pPr>
-            <a:r>
-              <a:rPr lang="en-US" sz="1600" dirty="0" smtClean="0"/>
-              <a:t>614-445-2784</a:t>
-            </a:r>
-          </a:p>
-          <a:p>
-            <a:pPr>
-              <a:buNone/>
-            </a:pPr>
-            <a:endParaRPr lang="en-US" dirty="0"/>
+              <a:t>http://www.cheezyworld.com</a:t>
+            </a:r>
+            <a:endParaRPr lang="en-US" sz="2800" dirty="0" smtClean="0"/>
+          </a:p>
+          <a:p>
+            <a:r>
+              <a:rPr lang="en-US" sz="2800" dirty="0" smtClean="0"/>
+              <a:t>Samples and Presentation:  </a:t>
+            </a:r>
+            <a:r>
+              <a:rPr lang="en-US" sz="2800" dirty="0" err="1" smtClean="0">
+                <a:hlinkClick r:id="rId4"/>
+              </a:rPr>
+              <a:t>git@github.com:shawnewallace</a:t>
+            </a:r>
+            <a:r>
+              <a:rPr lang="en-US" sz="2800" dirty="0" smtClean="0">
+                <a:hlinkClick r:id="rId4"/>
+              </a:rPr>
+              <a:t>/Katas.git</a:t>
+            </a:r>
+            <a:endParaRPr lang="en-US" sz="2800" dirty="0" smtClean="0"/>
+          </a:p>
+          <a:p>
+            <a:r>
+              <a:rPr lang="en-US" sz="2800" u="sng" dirty="0" smtClean="0"/>
+              <a:t>The </a:t>
+            </a:r>
+            <a:r>
+              <a:rPr lang="en-US" sz="2800" u="sng" dirty="0" err="1" smtClean="0"/>
+              <a:t>Rspec</a:t>
+            </a:r>
+            <a:r>
+              <a:rPr lang="en-US" sz="2800" u="sng" dirty="0" smtClean="0"/>
+              <a:t> Book</a:t>
+            </a:r>
+            <a:r>
+              <a:rPr lang="en-US" sz="2800" dirty="0" smtClean="0"/>
+              <a:t>, David </a:t>
+            </a:r>
+            <a:r>
+              <a:rPr lang="en-US" sz="2800" dirty="0" err="1" smtClean="0"/>
+              <a:t>Chelimsky</a:t>
+            </a:r>
+            <a:r>
+              <a:rPr lang="en-US" sz="2800" dirty="0" smtClean="0"/>
+              <a:t>:  </a:t>
+            </a:r>
+            <a:r>
+              <a:rPr lang="en-US" sz="2800" dirty="0" smtClean="0">
+                <a:hlinkClick r:id="rId5"/>
+              </a:rPr>
+              <a:t>http://www.pragprog.com/titles/achbd/the-rspec-book</a:t>
+            </a:r>
+            <a:endParaRPr lang="en-US" sz="2800" dirty="0" smtClean="0"/>
+          </a:p>
+          <a:p>
+            <a:endParaRPr lang="en-US" sz="2800" dirty="0" smtClean="0"/>
+          </a:p>
+          <a:p>
+            <a:endParaRPr lang="en-US" sz="2800" dirty="0"/>
           </a:p>
         </p:txBody>
       </p:sp>

</xml_diff>